<commit_message>
Chloe and Jacob final presentation
</commit_message>
<xml_diff>
--- a/DATA 400 Final Presentation.pptx
+++ b/DATA 400 Final Presentation.pptx
@@ -8,14 +8,17 @@
     <p:sldId id="256" r:id="rId2"/>
     <p:sldId id="257" r:id="rId3"/>
     <p:sldId id="258" r:id="rId4"/>
-    <p:sldId id="259" r:id="rId5"/>
-    <p:sldId id="261" r:id="rId6"/>
-    <p:sldId id="262" r:id="rId7"/>
-    <p:sldId id="260" r:id="rId8"/>
-    <p:sldId id="263" r:id="rId9"/>
-    <p:sldId id="267" r:id="rId10"/>
-    <p:sldId id="266" r:id="rId11"/>
-    <p:sldId id="265" r:id="rId12"/>
+    <p:sldId id="268" r:id="rId5"/>
+    <p:sldId id="270" r:id="rId6"/>
+    <p:sldId id="259" r:id="rId7"/>
+    <p:sldId id="261" r:id="rId8"/>
+    <p:sldId id="262" r:id="rId9"/>
+    <p:sldId id="260" r:id="rId10"/>
+    <p:sldId id="263" r:id="rId11"/>
+    <p:sldId id="267" r:id="rId12"/>
+    <p:sldId id="272" r:id="rId13"/>
+    <p:sldId id="266" r:id="rId14"/>
+    <p:sldId id="265" r:id="rId15"/>
   </p:sldIdLst>
   <p:sldSz cx="12192000" cy="6858000"/>
   <p:notesSz cx="6858000" cy="9144000"/>
@@ -127,1448 +130,10 @@
   <p1510:revLst>
     <p1510:client id="{35D40A17-335A-5745-00C5-31581B994F3D}" v="74" dt="2024-05-14T01:58:56.156"/>
     <p1510:client id="{3E6DE1B9-678E-3A4F-E0B2-5898F428C0A4}" v="49" dt="2024-05-12T17:55:26.314"/>
+    <p1510:client id="{6609DC8E-0BA6-458B-0A24-F6076134C244}" v="231" dt="2024-05-14T12:58:13.262"/>
     <p1510:client id="{CA7326BE-D726-4895-F960-995616F16296}" v="64" dt="2024-05-12T17:49:37.920"/>
   </p1510:revLst>
 </p1510:revInfo>
-</file>
-
-<file path=ppt/changesInfos/changesInfo1.xml><?xml version="1.0" encoding="utf-8"?>
-<pc:chgInfo xmlns:a="http://schemas.openxmlformats.org/drawingml/2006/main" xmlns:r="http://schemas.openxmlformats.org/officeDocument/2006/relationships" xmlns:ac="http://schemas.microsoft.com/office/drawing/2013/main/command" xmlns:pc="http://schemas.microsoft.com/office/powerpoint/2013/main/command">
-  <pc:docChgLst>
-    <pc:chgData name="Ho, Chloe" userId="S::hochl@dickinson.edu::2f1fe282-63b7-44b8-a16d-2d8dc8fa8de6" providerId="AD" clId="Web-{CA7326BE-D726-4895-F960-995616F16296}"/>
-    <pc:docChg chg="modSld sldOrd">
-      <pc:chgData name="Ho, Chloe" userId="S::hochl@dickinson.edu::2f1fe282-63b7-44b8-a16d-2d8dc8fa8de6" providerId="AD" clId="Web-{CA7326BE-D726-4895-F960-995616F16296}" dt="2024-05-12T17:49:37.920" v="61" actId="20577"/>
-      <pc:docMkLst>
-        <pc:docMk/>
-      </pc:docMkLst>
-      <pc:sldChg chg="addSp delSp modSp">
-        <pc:chgData name="Ho, Chloe" userId="S::hochl@dickinson.edu::2f1fe282-63b7-44b8-a16d-2d8dc8fa8de6" providerId="AD" clId="Web-{CA7326BE-D726-4895-F960-995616F16296}" dt="2024-05-12T17:49:37.920" v="61" actId="20577"/>
-        <pc:sldMkLst>
-          <pc:docMk/>
-          <pc:sldMk cId="3685718716" sldId="263"/>
-        </pc:sldMkLst>
-        <pc:spChg chg="add mod">
-          <ac:chgData name="Ho, Chloe" userId="S::hochl@dickinson.edu::2f1fe282-63b7-44b8-a16d-2d8dc8fa8de6" providerId="AD" clId="Web-{CA7326BE-D726-4895-F960-995616F16296}" dt="2024-05-12T17:49:37.920" v="61" actId="20577"/>
-          <ac:spMkLst>
-            <pc:docMk/>
-            <pc:sldMk cId="3685718716" sldId="263"/>
-            <ac:spMk id="4" creationId="{4B15FA22-8E28-4725-CA61-F124A16F23BC}"/>
-          </ac:spMkLst>
-        </pc:spChg>
-        <pc:picChg chg="del">
-          <ac:chgData name="Ho, Chloe" userId="S::hochl@dickinson.edu::2f1fe282-63b7-44b8-a16d-2d8dc8fa8de6" providerId="AD" clId="Web-{CA7326BE-D726-4895-F960-995616F16296}" dt="2024-05-12T17:47:09.668" v="1"/>
-          <ac:picMkLst>
-            <pc:docMk/>
-            <pc:sldMk cId="3685718716" sldId="263"/>
-            <ac:picMk id="7" creationId="{E312E8B2-9BCA-B9A8-CD7C-9B7ED642BD97}"/>
-          </ac:picMkLst>
-        </pc:picChg>
-        <pc:picChg chg="mod">
-          <ac:chgData name="Ho, Chloe" userId="S::hochl@dickinson.edu::2f1fe282-63b7-44b8-a16d-2d8dc8fa8de6" providerId="AD" clId="Web-{CA7326BE-D726-4895-F960-995616F16296}" dt="2024-05-12T17:48:36.919" v="8" actId="1076"/>
-          <ac:picMkLst>
-            <pc:docMk/>
-            <pc:sldMk cId="3685718716" sldId="263"/>
-            <ac:picMk id="9" creationId="{D7D3CEDC-08F8-CBEF-9B55-4377A7F925E9}"/>
-          </ac:picMkLst>
-        </pc:picChg>
-      </pc:sldChg>
-      <pc:sldChg chg="modSp">
-        <pc:chgData name="Ho, Chloe" userId="S::hochl@dickinson.edu::2f1fe282-63b7-44b8-a16d-2d8dc8fa8de6" providerId="AD" clId="Web-{CA7326BE-D726-4895-F960-995616F16296}" dt="2024-05-12T17:47:36.919" v="7" actId="20577"/>
-        <pc:sldMkLst>
-          <pc:docMk/>
-          <pc:sldMk cId="3532583803" sldId="265"/>
-        </pc:sldMkLst>
-        <pc:spChg chg="mod">
-          <ac:chgData name="Ho, Chloe" userId="S::hochl@dickinson.edu::2f1fe282-63b7-44b8-a16d-2d8dc8fa8de6" providerId="AD" clId="Web-{CA7326BE-D726-4895-F960-995616F16296}" dt="2024-05-12T17:47:36.919" v="7" actId="20577"/>
-          <ac:spMkLst>
-            <pc:docMk/>
-            <pc:sldMk cId="3532583803" sldId="265"/>
-            <ac:spMk id="2" creationId="{7647F5F8-5499-174A-B2C7-20D71FB238C1}"/>
-          </ac:spMkLst>
-        </pc:spChg>
-        <pc:spChg chg="mod">
-          <ac:chgData name="Ho, Chloe" userId="S::hochl@dickinson.edu::2f1fe282-63b7-44b8-a16d-2d8dc8fa8de6" providerId="AD" clId="Web-{CA7326BE-D726-4895-F960-995616F16296}" dt="2024-05-12T17:47:22.090" v="4" actId="14100"/>
-          <ac:spMkLst>
-            <pc:docMk/>
-            <pc:sldMk cId="3532583803" sldId="265"/>
-            <ac:spMk id="4" creationId="{03CB3421-4EA0-0E10-69C0-ED9EAD034082}"/>
-          </ac:spMkLst>
-        </pc:spChg>
-        <pc:spChg chg="mod">
-          <ac:chgData name="Ho, Chloe" userId="S::hochl@dickinson.edu::2f1fe282-63b7-44b8-a16d-2d8dc8fa8de6" providerId="AD" clId="Web-{CA7326BE-D726-4895-F960-995616F16296}" dt="2024-05-12T17:47:22.090" v="4" actId="14100"/>
-          <ac:spMkLst>
-            <pc:docMk/>
-            <pc:sldMk cId="3532583803" sldId="265"/>
-            <ac:spMk id="6" creationId="{4BAF1019-0BAB-B050-9600-84FFA108020A}"/>
-          </ac:spMkLst>
-        </pc:spChg>
-      </pc:sldChg>
-      <pc:sldChg chg="ord">
-        <pc:chgData name="Ho, Chloe" userId="S::hochl@dickinson.edu::2f1fe282-63b7-44b8-a16d-2d8dc8fa8de6" providerId="AD" clId="Web-{CA7326BE-D726-4895-F960-995616F16296}" dt="2024-05-12T17:47:34.137" v="6"/>
-        <pc:sldMkLst>
-          <pc:docMk/>
-          <pc:sldMk cId="1678077615" sldId="266"/>
-        </pc:sldMkLst>
-      </pc:sldChg>
-    </pc:docChg>
-  </pc:docChgLst>
-  <pc:docChgLst>
-    <pc:chgData name="Ho, Chloe" userId="S::hochl@dickinson.edu::2f1fe282-63b7-44b8-a16d-2d8dc8fa8de6" providerId="AD" clId="Web-{3E6DE1B9-678E-3A4F-E0B2-5898F428C0A4}"/>
-    <pc:docChg chg="modSld">
-      <pc:chgData name="Ho, Chloe" userId="S::hochl@dickinson.edu::2f1fe282-63b7-44b8-a16d-2d8dc8fa8de6" providerId="AD" clId="Web-{3E6DE1B9-678E-3A4F-E0B2-5898F428C0A4}" dt="2024-05-12T17:55:26.314" v="57" actId="1076"/>
-      <pc:docMkLst>
-        <pc:docMk/>
-      </pc:docMkLst>
-      <pc:sldChg chg="modSp">
-        <pc:chgData name="Ho, Chloe" userId="S::hochl@dickinson.edu::2f1fe282-63b7-44b8-a16d-2d8dc8fa8de6" providerId="AD" clId="Web-{3E6DE1B9-678E-3A4F-E0B2-5898F428C0A4}" dt="2024-05-12T17:55:26.314" v="57" actId="1076"/>
-        <pc:sldMkLst>
-          <pc:docMk/>
-          <pc:sldMk cId="3685718716" sldId="263"/>
-        </pc:sldMkLst>
-        <pc:spChg chg="mod">
-          <ac:chgData name="Ho, Chloe" userId="S::hochl@dickinson.edu::2f1fe282-63b7-44b8-a16d-2d8dc8fa8de6" providerId="AD" clId="Web-{3E6DE1B9-678E-3A4F-E0B2-5898F428C0A4}" dt="2024-05-12T17:55:15.422" v="53" actId="20577"/>
-          <ac:spMkLst>
-            <pc:docMk/>
-            <pc:sldMk cId="3685718716" sldId="263"/>
-            <ac:spMk id="4" creationId="{4B15FA22-8E28-4725-CA61-F124A16F23BC}"/>
-          </ac:spMkLst>
-        </pc:spChg>
-        <pc:picChg chg="mod">
-          <ac:chgData name="Ho, Chloe" userId="S::hochl@dickinson.edu::2f1fe282-63b7-44b8-a16d-2d8dc8fa8de6" providerId="AD" clId="Web-{3E6DE1B9-678E-3A4F-E0B2-5898F428C0A4}" dt="2024-05-12T17:55:26.314" v="57" actId="1076"/>
-          <ac:picMkLst>
-            <pc:docMk/>
-            <pc:sldMk cId="3685718716" sldId="263"/>
-            <ac:picMk id="9" creationId="{D7D3CEDC-08F8-CBEF-9B55-4377A7F925E9}"/>
-          </ac:picMkLst>
-        </pc:picChg>
-      </pc:sldChg>
-      <pc:sldChg chg="modSp">
-        <pc:chgData name="Ho, Chloe" userId="S::hochl@dickinson.edu::2f1fe282-63b7-44b8-a16d-2d8dc8fa8de6" providerId="AD" clId="Web-{3E6DE1B9-678E-3A4F-E0B2-5898F428C0A4}" dt="2024-05-12T17:54:33.249" v="52" actId="20577"/>
-        <pc:sldMkLst>
-          <pc:docMk/>
-          <pc:sldMk cId="3532583803" sldId="265"/>
-        </pc:sldMkLst>
-        <pc:spChg chg="mod">
-          <ac:chgData name="Ho, Chloe" userId="S::hochl@dickinson.edu::2f1fe282-63b7-44b8-a16d-2d8dc8fa8de6" providerId="AD" clId="Web-{3E6DE1B9-678E-3A4F-E0B2-5898F428C0A4}" dt="2024-05-12T17:54:33.249" v="52" actId="20577"/>
-          <ac:spMkLst>
-            <pc:docMk/>
-            <pc:sldMk cId="3532583803" sldId="265"/>
-            <ac:spMk id="2" creationId="{7647F5F8-5499-174A-B2C7-20D71FB238C1}"/>
-          </ac:spMkLst>
-        </pc:spChg>
-      </pc:sldChg>
-      <pc:sldChg chg="addSp delSp modSp mod setBg">
-        <pc:chgData name="Ho, Chloe" userId="S::hochl@dickinson.edu::2f1fe282-63b7-44b8-a16d-2d8dc8fa8de6" providerId="AD" clId="Web-{3E6DE1B9-678E-3A4F-E0B2-5898F428C0A4}" dt="2024-05-12T17:54:27.608" v="51" actId="20577"/>
-        <pc:sldMkLst>
-          <pc:docMk/>
-          <pc:sldMk cId="1678077615" sldId="266"/>
-        </pc:sldMkLst>
-        <pc:spChg chg="mod">
-          <ac:chgData name="Ho, Chloe" userId="S::hochl@dickinson.edu::2f1fe282-63b7-44b8-a16d-2d8dc8fa8de6" providerId="AD" clId="Web-{3E6DE1B9-678E-3A4F-E0B2-5898F428C0A4}" dt="2024-05-12T17:54:27.608" v="51" actId="20577"/>
-          <ac:spMkLst>
-            <pc:docMk/>
-            <pc:sldMk cId="1678077615" sldId="266"/>
-            <ac:spMk id="2" creationId="{A1C44874-C124-4237-5EE2-3678DED8BED1}"/>
-          </ac:spMkLst>
-        </pc:spChg>
-        <pc:spChg chg="del mod">
-          <ac:chgData name="Ho, Chloe" userId="S::hochl@dickinson.edu::2f1fe282-63b7-44b8-a16d-2d8dc8fa8de6" providerId="AD" clId="Web-{3E6DE1B9-678E-3A4F-E0B2-5898F428C0A4}" dt="2024-05-12T17:54:22.998" v="48"/>
-          <ac:spMkLst>
-            <pc:docMk/>
-            <pc:sldMk cId="1678077615" sldId="266"/>
-            <ac:spMk id="3" creationId="{1E9BD0CF-DAD6-C350-57AC-FFB062737FA2}"/>
-          </ac:spMkLst>
-        </pc:spChg>
-        <pc:spChg chg="add">
-          <ac:chgData name="Ho, Chloe" userId="S::hochl@dickinson.edu::2f1fe282-63b7-44b8-a16d-2d8dc8fa8de6" providerId="AD" clId="Web-{3E6DE1B9-678E-3A4F-E0B2-5898F428C0A4}" dt="2024-05-12T17:54:22.998" v="48"/>
-          <ac:spMkLst>
-            <pc:docMk/>
-            <pc:sldMk cId="1678077615" sldId="266"/>
-            <ac:spMk id="9" creationId="{B937640E-EF7A-4A6C-A950-D12B7D5C923E}"/>
-          </ac:spMkLst>
-        </pc:spChg>
-        <pc:spChg chg="add">
-          <ac:chgData name="Ho, Chloe" userId="S::hochl@dickinson.edu::2f1fe282-63b7-44b8-a16d-2d8dc8fa8de6" providerId="AD" clId="Web-{3E6DE1B9-678E-3A4F-E0B2-5898F428C0A4}" dt="2024-05-12T17:54:22.998" v="48"/>
-          <ac:spMkLst>
-            <pc:docMk/>
-            <pc:sldMk cId="1678077615" sldId="266"/>
-            <ac:spMk id="11" creationId="{FFF975DA-2F73-4697-B7A9-A2E834712394}"/>
-          </ac:spMkLst>
-        </pc:spChg>
-        <pc:graphicFrameChg chg="add">
-          <ac:chgData name="Ho, Chloe" userId="S::hochl@dickinson.edu::2f1fe282-63b7-44b8-a16d-2d8dc8fa8de6" providerId="AD" clId="Web-{3E6DE1B9-678E-3A4F-E0B2-5898F428C0A4}" dt="2024-05-12T17:54:22.998" v="48"/>
-          <ac:graphicFrameMkLst>
-            <pc:docMk/>
-            <pc:sldMk cId="1678077615" sldId="266"/>
-            <ac:graphicFrameMk id="5" creationId="{D08F0493-9791-53E2-F782-64F90E3FBDCF}"/>
-          </ac:graphicFrameMkLst>
-        </pc:graphicFrameChg>
-      </pc:sldChg>
-    </pc:docChg>
-  </pc:docChgLst>
-  <pc:docChgLst>
-    <pc:chgData name="Ho, Chloe" userId="S::hochl@dickinson.edu::2f1fe282-63b7-44b8-a16d-2d8dc8fa8de6" providerId="AD" clId="Web-{35D40A17-335A-5745-00C5-31581B994F3D}"/>
-    <pc:docChg chg="addSld modSld">
-      <pc:chgData name="Ho, Chloe" userId="S::hochl@dickinson.edu::2f1fe282-63b7-44b8-a16d-2d8dc8fa8de6" providerId="AD" clId="Web-{35D40A17-335A-5745-00C5-31581B994F3D}" dt="2024-05-14T01:58:56.156" v="68" actId="1076"/>
-      <pc:docMkLst>
-        <pc:docMk/>
-      </pc:docMkLst>
-      <pc:sldChg chg="modSp">
-        <pc:chgData name="Ho, Chloe" userId="S::hochl@dickinson.edu::2f1fe282-63b7-44b8-a16d-2d8dc8fa8de6" providerId="AD" clId="Web-{35D40A17-335A-5745-00C5-31581B994F3D}" dt="2024-05-14T01:58:56.156" v="68" actId="1076"/>
-        <pc:sldMkLst>
-          <pc:docMk/>
-          <pc:sldMk cId="3685718716" sldId="263"/>
-        </pc:sldMkLst>
-        <pc:spChg chg="mod">
-          <ac:chgData name="Ho, Chloe" userId="S::hochl@dickinson.edu::2f1fe282-63b7-44b8-a16d-2d8dc8fa8de6" providerId="AD" clId="Web-{35D40A17-335A-5745-00C5-31581B994F3D}" dt="2024-05-14T01:58:56.156" v="68" actId="1076"/>
-          <ac:spMkLst>
-            <pc:docMk/>
-            <pc:sldMk cId="3685718716" sldId="263"/>
-            <ac:spMk id="2" creationId="{44316FE5-4E2E-937A-16E5-4730E8DF97EC}"/>
-          </ac:spMkLst>
-        </pc:spChg>
-      </pc:sldChg>
-      <pc:sldChg chg="addSp delSp modSp new">
-        <pc:chgData name="Ho, Chloe" userId="S::hochl@dickinson.edu::2f1fe282-63b7-44b8-a16d-2d8dc8fa8de6" providerId="AD" clId="Web-{35D40A17-335A-5745-00C5-31581B994F3D}" dt="2024-05-14T01:57:54.811" v="67" actId="1076"/>
-        <pc:sldMkLst>
-          <pc:docMk/>
-          <pc:sldMk cId="1587400543" sldId="267"/>
-        </pc:sldMkLst>
-        <pc:spChg chg="add del mod">
-          <ac:chgData name="Ho, Chloe" userId="S::hochl@dickinson.edu::2f1fe282-63b7-44b8-a16d-2d8dc8fa8de6" providerId="AD" clId="Web-{35D40A17-335A-5745-00C5-31581B994F3D}" dt="2024-05-14T01:57:39.170" v="64" actId="20577"/>
-          <ac:spMkLst>
-            <pc:docMk/>
-            <pc:sldMk cId="1587400543" sldId="267"/>
-            <ac:spMk id="2" creationId="{21C7CBC9-23E0-7122-1161-5A9CBB7F1923}"/>
-          </ac:spMkLst>
-        </pc:spChg>
-        <pc:spChg chg="del">
-          <ac:chgData name="Ho, Chloe" userId="S::hochl@dickinson.edu::2f1fe282-63b7-44b8-a16d-2d8dc8fa8de6" providerId="AD" clId="Web-{35D40A17-335A-5745-00C5-31581B994F3D}" dt="2024-05-14T01:55:09.699" v="18"/>
-          <ac:spMkLst>
-            <pc:docMk/>
-            <pc:sldMk cId="1587400543" sldId="267"/>
-            <ac:spMk id="3" creationId="{3055E865-53BC-58FB-7F6C-09623B5B93C1}"/>
-          </ac:spMkLst>
-        </pc:spChg>
-        <pc:spChg chg="add del mod">
-          <ac:chgData name="Ho, Chloe" userId="S::hochl@dickinson.edu::2f1fe282-63b7-44b8-a16d-2d8dc8fa8de6" providerId="AD" clId="Web-{35D40A17-335A-5745-00C5-31581B994F3D}" dt="2024-05-14T01:54:24.964" v="14"/>
-          <ac:spMkLst>
-            <pc:docMk/>
-            <pc:sldMk cId="1587400543" sldId="267"/>
-            <ac:spMk id="5" creationId="{BA0D246C-F006-D43F-8685-8D8C749FD539}"/>
-          </ac:spMkLst>
-        </pc:spChg>
-        <pc:picChg chg="add mod ord modCrop">
-          <ac:chgData name="Ho, Chloe" userId="S::hochl@dickinson.edu::2f1fe282-63b7-44b8-a16d-2d8dc8fa8de6" providerId="AD" clId="Web-{35D40A17-335A-5745-00C5-31581B994F3D}" dt="2024-05-14T01:57:54.811" v="67" actId="1076"/>
-          <ac:picMkLst>
-            <pc:docMk/>
-            <pc:sldMk cId="1587400543" sldId="267"/>
-            <ac:picMk id="6" creationId="{26ED52D6-D91F-34B9-E065-ECCE626BDA4E}"/>
-          </ac:picMkLst>
-        </pc:picChg>
-      </pc:sldChg>
-    </pc:docChg>
-  </pc:docChgLst>
-  <pc:docChgLst>
-    <pc:chgData name="Ho, Chloe" userId="S::hochl@dickinson.edu::2f1fe282-63b7-44b8-a16d-2d8dc8fa8de6" providerId="AD" clId="Web-{58F8AD92-E8B7-4CCA-B37B-FEE9AABF84D3}"/>
-    <pc:docChg chg="addSld delSld modSld addMainMaster delMainMaster">
-      <pc:chgData name="Ho, Chloe" userId="S::hochl@dickinson.edu::2f1fe282-63b7-44b8-a16d-2d8dc8fa8de6" providerId="AD" clId="Web-{58F8AD92-E8B7-4CCA-B37B-FEE9AABF84D3}" dt="2024-05-09T01:58:59.093" v="515" actId="1076"/>
-      <pc:docMkLst>
-        <pc:docMk/>
-      </pc:docMkLst>
-      <pc:sldChg chg="addSp delSp modSp mod setBg modClrScheme setClrOvrMap chgLayout">
-        <pc:chgData name="Ho, Chloe" userId="S::hochl@dickinson.edu::2f1fe282-63b7-44b8-a16d-2d8dc8fa8de6" providerId="AD" clId="Web-{58F8AD92-E8B7-4CCA-B37B-FEE9AABF84D3}" dt="2024-05-09T01:37:44.479" v="39"/>
-        <pc:sldMkLst>
-          <pc:docMk/>
-          <pc:sldMk cId="109857222" sldId="256"/>
-        </pc:sldMkLst>
-        <pc:spChg chg="mod">
-          <ac:chgData name="Ho, Chloe" userId="S::hochl@dickinson.edu::2f1fe282-63b7-44b8-a16d-2d8dc8fa8de6" providerId="AD" clId="Web-{58F8AD92-E8B7-4CCA-B37B-FEE9AABF84D3}" dt="2024-05-09T01:37:44.479" v="39"/>
-          <ac:spMkLst>
-            <pc:docMk/>
-            <pc:sldMk cId="109857222" sldId="256"/>
-            <ac:spMk id="2" creationId="{00000000-0000-0000-0000-000000000000}"/>
-          </ac:spMkLst>
-        </pc:spChg>
-        <pc:spChg chg="mod">
-          <ac:chgData name="Ho, Chloe" userId="S::hochl@dickinson.edu::2f1fe282-63b7-44b8-a16d-2d8dc8fa8de6" providerId="AD" clId="Web-{58F8AD92-E8B7-4CCA-B37B-FEE9AABF84D3}" dt="2024-05-09T01:37:44.479" v="39"/>
-          <ac:spMkLst>
-            <pc:docMk/>
-            <pc:sldMk cId="109857222" sldId="256"/>
-            <ac:spMk id="3" creationId="{00000000-0000-0000-0000-000000000000}"/>
-          </ac:spMkLst>
-        </pc:spChg>
-        <pc:spChg chg="add del">
-          <ac:chgData name="Ho, Chloe" userId="S::hochl@dickinson.edu::2f1fe282-63b7-44b8-a16d-2d8dc8fa8de6" providerId="AD" clId="Web-{58F8AD92-E8B7-4CCA-B37B-FEE9AABF84D3}" dt="2024-05-09T01:37:26.151" v="25"/>
-          <ac:spMkLst>
-            <pc:docMk/>
-            <pc:sldMk cId="109857222" sldId="256"/>
-            <ac:spMk id="9" creationId="{E08D4B6A-8113-4DFB-B82E-B60CAC8E0A50}"/>
-          </ac:spMkLst>
-        </pc:spChg>
-        <pc:spChg chg="add">
-          <ac:chgData name="Ho, Chloe" userId="S::hochl@dickinson.edu::2f1fe282-63b7-44b8-a16d-2d8dc8fa8de6" providerId="AD" clId="Web-{58F8AD92-E8B7-4CCA-B37B-FEE9AABF84D3}" dt="2024-05-09T01:37:44.479" v="39"/>
-          <ac:spMkLst>
-            <pc:docMk/>
-            <pc:sldMk cId="109857222" sldId="256"/>
-            <ac:spMk id="10" creationId="{087C4FDF-D217-4821-A221-1C752E3F3090}"/>
-          </ac:spMkLst>
-        </pc:spChg>
-        <pc:spChg chg="add del">
-          <ac:chgData name="Ho, Chloe" userId="S::hochl@dickinson.edu::2f1fe282-63b7-44b8-a16d-2d8dc8fa8de6" providerId="AD" clId="Web-{58F8AD92-E8B7-4CCA-B37B-FEE9AABF84D3}" dt="2024-05-09T01:37:26.151" v="25"/>
-          <ac:spMkLst>
-            <pc:docMk/>
-            <pc:sldMk cId="109857222" sldId="256"/>
-            <ac:spMk id="11" creationId="{9822E561-F97C-4CBB-A9A6-A6BF6317BC84}"/>
-          </ac:spMkLst>
-        </pc:spChg>
-        <pc:spChg chg="add">
-          <ac:chgData name="Ho, Chloe" userId="S::hochl@dickinson.edu::2f1fe282-63b7-44b8-a16d-2d8dc8fa8de6" providerId="AD" clId="Web-{58F8AD92-E8B7-4CCA-B37B-FEE9AABF84D3}" dt="2024-05-09T01:37:44.479" v="39"/>
-          <ac:spMkLst>
-            <pc:docMk/>
-            <pc:sldMk cId="109857222" sldId="256"/>
-            <ac:spMk id="12" creationId="{12C75CB5-D62C-410A-9B85-22367B6892AB}"/>
-          </ac:spMkLst>
-        </pc:spChg>
-        <pc:spChg chg="add del">
-          <ac:chgData name="Ho, Chloe" userId="S::hochl@dickinson.edu::2f1fe282-63b7-44b8-a16d-2d8dc8fa8de6" providerId="AD" clId="Web-{58F8AD92-E8B7-4CCA-B37B-FEE9AABF84D3}" dt="2024-05-09T01:37:26.151" v="25"/>
-          <ac:spMkLst>
-            <pc:docMk/>
-            <pc:sldMk cId="109857222" sldId="256"/>
-            <ac:spMk id="13" creationId="{B01B0E58-A5C8-4CDA-A2E0-35DF94E59857}"/>
-          </ac:spMkLst>
-        </pc:spChg>
-        <pc:spChg chg="add">
-          <ac:chgData name="Ho, Chloe" userId="S::hochl@dickinson.edu::2f1fe282-63b7-44b8-a16d-2d8dc8fa8de6" providerId="AD" clId="Web-{58F8AD92-E8B7-4CCA-B37B-FEE9AABF84D3}" dt="2024-05-09T01:37:44.479" v="39"/>
-          <ac:spMkLst>
-            <pc:docMk/>
-            <pc:sldMk cId="109857222" sldId="256"/>
-            <ac:spMk id="14" creationId="{B23D5574-8E19-4607-A618-0678D0EBDF92}"/>
-          </ac:spMkLst>
-        </pc:spChg>
-        <pc:picChg chg="add del">
-          <ac:chgData name="Ho, Chloe" userId="S::hochl@dickinson.edu::2f1fe282-63b7-44b8-a16d-2d8dc8fa8de6" providerId="AD" clId="Web-{58F8AD92-E8B7-4CCA-B37B-FEE9AABF84D3}" dt="2024-05-09T01:37:26.151" v="25"/>
-          <ac:picMkLst>
-            <pc:docMk/>
-            <pc:sldMk cId="109857222" sldId="256"/>
-            <ac:picMk id="4" creationId="{94831658-2AFC-385B-3D4D-45554C1424A8}"/>
-          </ac:picMkLst>
-        </pc:picChg>
-        <pc:picChg chg="add">
-          <ac:chgData name="Ho, Chloe" userId="S::hochl@dickinson.edu::2f1fe282-63b7-44b8-a16d-2d8dc8fa8de6" providerId="AD" clId="Web-{58F8AD92-E8B7-4CCA-B37B-FEE9AABF84D3}" dt="2024-05-09T01:37:44.479" v="39"/>
-          <ac:picMkLst>
-            <pc:docMk/>
-            <pc:sldMk cId="109857222" sldId="256"/>
-            <ac:picMk id="5" creationId="{7B08BC15-0E58-A332-AA26-B3B58D5B46BF}"/>
-          </ac:picMkLst>
-        </pc:picChg>
-        <pc:picChg chg="add">
-          <ac:chgData name="Ho, Chloe" userId="S::hochl@dickinson.edu::2f1fe282-63b7-44b8-a16d-2d8dc8fa8de6" providerId="AD" clId="Web-{58F8AD92-E8B7-4CCA-B37B-FEE9AABF84D3}" dt="2024-05-09T01:37:44.479" v="39"/>
-          <ac:picMkLst>
-            <pc:docMk/>
-            <pc:sldMk cId="109857222" sldId="256"/>
-            <ac:picMk id="6" creationId="{C370DAED-4D9C-AB9E-7B76-CC7D191A9A67}"/>
-          </ac:picMkLst>
-        </pc:picChg>
-      </pc:sldChg>
-      <pc:sldChg chg="addSp delSp modSp new mod setBg">
-        <pc:chgData name="Ho, Chloe" userId="S::hochl@dickinson.edu::2f1fe282-63b7-44b8-a16d-2d8dc8fa8de6" providerId="AD" clId="Web-{58F8AD92-E8B7-4CCA-B37B-FEE9AABF84D3}" dt="2024-05-09T01:44:27.934" v="167" actId="1076"/>
-        <pc:sldMkLst>
-          <pc:docMk/>
-          <pc:sldMk cId="1858654033" sldId="257"/>
-        </pc:sldMkLst>
-        <pc:spChg chg="mod">
-          <ac:chgData name="Ho, Chloe" userId="S::hochl@dickinson.edu::2f1fe282-63b7-44b8-a16d-2d8dc8fa8de6" providerId="AD" clId="Web-{58F8AD92-E8B7-4CCA-B37B-FEE9AABF84D3}" dt="2024-05-09T01:44:27.934" v="167" actId="1076"/>
-          <ac:spMkLst>
-            <pc:docMk/>
-            <pc:sldMk cId="1858654033" sldId="257"/>
-            <ac:spMk id="2" creationId="{6B6F6EF7-86B6-06EA-B088-535D639F350A}"/>
-          </ac:spMkLst>
-        </pc:spChg>
-        <pc:spChg chg="del mod">
-          <ac:chgData name="Ho, Chloe" userId="S::hochl@dickinson.edu::2f1fe282-63b7-44b8-a16d-2d8dc8fa8de6" providerId="AD" clId="Web-{58F8AD92-E8B7-4CCA-B37B-FEE9AABF84D3}" dt="2024-05-09T01:44:02.840" v="157"/>
-          <ac:spMkLst>
-            <pc:docMk/>
-            <pc:sldMk cId="1858654033" sldId="257"/>
-            <ac:spMk id="3" creationId="{31ACC79A-DEFD-B499-5935-AA131E39A688}"/>
-          </ac:spMkLst>
-        </pc:spChg>
-        <pc:spChg chg="add">
-          <ac:chgData name="Ho, Chloe" userId="S::hochl@dickinson.edu::2f1fe282-63b7-44b8-a16d-2d8dc8fa8de6" providerId="AD" clId="Web-{58F8AD92-E8B7-4CCA-B37B-FEE9AABF84D3}" dt="2024-05-09T01:44:02.840" v="157"/>
-          <ac:spMkLst>
-            <pc:docMk/>
-            <pc:sldMk cId="1858654033" sldId="257"/>
-            <ac:spMk id="9" creationId="{B937640E-EF7A-4A6C-A950-D12B7D5C923E}"/>
-          </ac:spMkLst>
-        </pc:spChg>
-        <pc:spChg chg="add">
-          <ac:chgData name="Ho, Chloe" userId="S::hochl@dickinson.edu::2f1fe282-63b7-44b8-a16d-2d8dc8fa8de6" providerId="AD" clId="Web-{58F8AD92-E8B7-4CCA-B37B-FEE9AABF84D3}" dt="2024-05-09T01:44:02.840" v="157"/>
-          <ac:spMkLst>
-            <pc:docMk/>
-            <pc:sldMk cId="1858654033" sldId="257"/>
-            <ac:spMk id="11" creationId="{9146CCC8-AA39-4037-B3E2-70602B93FFA0}"/>
-          </ac:spMkLst>
-        </pc:spChg>
-        <pc:graphicFrameChg chg="add">
-          <ac:chgData name="Ho, Chloe" userId="S::hochl@dickinson.edu::2f1fe282-63b7-44b8-a16d-2d8dc8fa8de6" providerId="AD" clId="Web-{58F8AD92-E8B7-4CCA-B37B-FEE9AABF84D3}" dt="2024-05-09T01:44:02.840" v="157"/>
-          <ac:graphicFrameMkLst>
-            <pc:docMk/>
-            <pc:sldMk cId="1858654033" sldId="257"/>
-            <ac:graphicFrameMk id="5" creationId="{4E0A5962-4A40-EE53-7A11-BA319309F71B}"/>
-          </ac:graphicFrameMkLst>
-        </pc:graphicFrameChg>
-      </pc:sldChg>
-      <pc:sldChg chg="modSp new del">
-        <pc:chgData name="Ho, Chloe" userId="S::hochl@dickinson.edu::2f1fe282-63b7-44b8-a16d-2d8dc8fa8de6" providerId="AD" clId="Web-{58F8AD92-E8B7-4CCA-B37B-FEE9AABF84D3}" dt="2024-05-09T01:37:23.979" v="24"/>
-        <pc:sldMkLst>
-          <pc:docMk/>
-          <pc:sldMk cId="2195013827" sldId="257"/>
-        </pc:sldMkLst>
-        <pc:spChg chg="mod">
-          <ac:chgData name="Ho, Chloe" userId="S::hochl@dickinson.edu::2f1fe282-63b7-44b8-a16d-2d8dc8fa8de6" providerId="AD" clId="Web-{58F8AD92-E8B7-4CCA-B37B-FEE9AABF84D3}" dt="2024-05-09T01:37:21.463" v="23" actId="20577"/>
-          <ac:spMkLst>
-            <pc:docMk/>
-            <pc:sldMk cId="2195013827" sldId="257"/>
-            <ac:spMk id="2" creationId="{7B63AD82-B25A-FBAC-5C6F-8FAE2FAB5034}"/>
-          </ac:spMkLst>
-        </pc:spChg>
-      </pc:sldChg>
-      <pc:sldChg chg="addSp delSp modSp new mod setBg">
-        <pc:chgData name="Ho, Chloe" userId="S::hochl@dickinson.edu::2f1fe282-63b7-44b8-a16d-2d8dc8fa8de6" providerId="AD" clId="Web-{58F8AD92-E8B7-4CCA-B37B-FEE9AABF84D3}" dt="2024-05-09T01:50:08.388" v="356"/>
-        <pc:sldMkLst>
-          <pc:docMk/>
-          <pc:sldMk cId="627918015" sldId="258"/>
-        </pc:sldMkLst>
-        <pc:spChg chg="mod">
-          <ac:chgData name="Ho, Chloe" userId="S::hochl@dickinson.edu::2f1fe282-63b7-44b8-a16d-2d8dc8fa8de6" providerId="AD" clId="Web-{58F8AD92-E8B7-4CCA-B37B-FEE9AABF84D3}" dt="2024-05-09T01:50:08.388" v="356"/>
-          <ac:spMkLst>
-            <pc:docMk/>
-            <pc:sldMk cId="627918015" sldId="258"/>
-            <ac:spMk id="2" creationId="{4AF7599B-FCC9-2789-EA71-50A361B8F757}"/>
-          </ac:spMkLst>
-        </pc:spChg>
-        <pc:spChg chg="add del mod">
-          <ac:chgData name="Ho, Chloe" userId="S::hochl@dickinson.edu::2f1fe282-63b7-44b8-a16d-2d8dc8fa8de6" providerId="AD" clId="Web-{58F8AD92-E8B7-4CCA-B37B-FEE9AABF84D3}" dt="2024-05-09T01:50:08.388" v="356"/>
-          <ac:spMkLst>
-            <pc:docMk/>
-            <pc:sldMk cId="627918015" sldId="258"/>
-            <ac:spMk id="3" creationId="{9FF13532-44B9-41B9-A217-B0D75A61B60F}"/>
-          </ac:spMkLst>
-        </pc:spChg>
-        <pc:spChg chg="add del">
-          <ac:chgData name="Ho, Chloe" userId="S::hochl@dickinson.edu::2f1fe282-63b7-44b8-a16d-2d8dc8fa8de6" providerId="AD" clId="Web-{58F8AD92-E8B7-4CCA-B37B-FEE9AABF84D3}" dt="2024-05-09T01:50:08.372" v="355"/>
-          <ac:spMkLst>
-            <pc:docMk/>
-            <pc:sldMk cId="627918015" sldId="258"/>
-            <ac:spMk id="9" creationId="{B937640E-EF7A-4A6C-A950-D12B7D5C923E}"/>
-          </ac:spMkLst>
-        </pc:spChg>
-        <pc:spChg chg="add del">
-          <ac:chgData name="Ho, Chloe" userId="S::hochl@dickinson.edu::2f1fe282-63b7-44b8-a16d-2d8dc8fa8de6" providerId="AD" clId="Web-{58F8AD92-E8B7-4CCA-B37B-FEE9AABF84D3}" dt="2024-05-09T01:50:08.372" v="355"/>
-          <ac:spMkLst>
-            <pc:docMk/>
-            <pc:sldMk cId="627918015" sldId="258"/>
-            <ac:spMk id="11" creationId="{FFF975DA-2F73-4697-B7A9-A2E834712394}"/>
-          </ac:spMkLst>
-        </pc:spChg>
-        <pc:spChg chg="add">
-          <ac:chgData name="Ho, Chloe" userId="S::hochl@dickinson.edu::2f1fe282-63b7-44b8-a16d-2d8dc8fa8de6" providerId="AD" clId="Web-{58F8AD92-E8B7-4CCA-B37B-FEE9AABF84D3}" dt="2024-05-09T01:50:08.388" v="356"/>
-          <ac:spMkLst>
-            <pc:docMk/>
-            <pc:sldMk cId="627918015" sldId="258"/>
-            <ac:spMk id="13" creationId="{B937640E-EF7A-4A6C-A950-D12B7D5C923E}"/>
-          </ac:spMkLst>
-        </pc:spChg>
-        <pc:spChg chg="add">
-          <ac:chgData name="Ho, Chloe" userId="S::hochl@dickinson.edu::2f1fe282-63b7-44b8-a16d-2d8dc8fa8de6" providerId="AD" clId="Web-{58F8AD92-E8B7-4CCA-B37B-FEE9AABF84D3}" dt="2024-05-09T01:50:08.388" v="356"/>
-          <ac:spMkLst>
-            <pc:docMk/>
-            <pc:sldMk cId="627918015" sldId="258"/>
-            <ac:spMk id="14" creationId="{FFF975DA-2F73-4697-B7A9-A2E834712394}"/>
-          </ac:spMkLst>
-        </pc:spChg>
-        <pc:graphicFrameChg chg="add del">
-          <ac:chgData name="Ho, Chloe" userId="S::hochl@dickinson.edu::2f1fe282-63b7-44b8-a16d-2d8dc8fa8de6" providerId="AD" clId="Web-{58F8AD92-E8B7-4CCA-B37B-FEE9AABF84D3}" dt="2024-05-09T01:50:08.372" v="355"/>
-          <ac:graphicFrameMkLst>
-            <pc:docMk/>
-            <pc:sldMk cId="627918015" sldId="258"/>
-            <ac:graphicFrameMk id="5" creationId="{226A72B0-824D-06BF-5FDE-D1C653132997}"/>
-          </ac:graphicFrameMkLst>
-        </pc:graphicFrameChg>
-        <pc:graphicFrameChg chg="add">
-          <ac:chgData name="Ho, Chloe" userId="S::hochl@dickinson.edu::2f1fe282-63b7-44b8-a16d-2d8dc8fa8de6" providerId="AD" clId="Web-{58F8AD92-E8B7-4CCA-B37B-FEE9AABF84D3}" dt="2024-05-09T01:50:08.388" v="356"/>
-          <ac:graphicFrameMkLst>
-            <pc:docMk/>
-            <pc:sldMk cId="627918015" sldId="258"/>
-            <ac:graphicFrameMk id="15" creationId="{D38C5F98-C8B5-D3C8-8547-C841D23E43CB}"/>
-          </ac:graphicFrameMkLst>
-        </pc:graphicFrameChg>
-      </pc:sldChg>
-      <pc:sldChg chg="addSp delSp modSp new mod setBg">
-        <pc:chgData name="Ho, Chloe" userId="S::hochl@dickinson.edu::2f1fe282-63b7-44b8-a16d-2d8dc8fa8de6" providerId="AD" clId="Web-{58F8AD92-E8B7-4CCA-B37B-FEE9AABF84D3}" dt="2024-05-09T01:54:32.311" v="435"/>
-        <pc:sldMkLst>
-          <pc:docMk/>
-          <pc:sldMk cId="3940602935" sldId="259"/>
-        </pc:sldMkLst>
-        <pc:spChg chg="mod">
-          <ac:chgData name="Ho, Chloe" userId="S::hochl@dickinson.edu::2f1fe282-63b7-44b8-a16d-2d8dc8fa8de6" providerId="AD" clId="Web-{58F8AD92-E8B7-4CCA-B37B-FEE9AABF84D3}" dt="2024-05-09T01:52:12.701" v="390"/>
-          <ac:spMkLst>
-            <pc:docMk/>
-            <pc:sldMk cId="3940602935" sldId="259"/>
-            <ac:spMk id="2" creationId="{35B86BE2-915B-B9EE-FC17-B5851AA1E383}"/>
-          </ac:spMkLst>
-        </pc:spChg>
-        <pc:spChg chg="del">
-          <ac:chgData name="Ho, Chloe" userId="S::hochl@dickinson.edu::2f1fe282-63b7-44b8-a16d-2d8dc8fa8de6" providerId="AD" clId="Web-{58F8AD92-E8B7-4CCA-B37B-FEE9AABF84D3}" dt="2024-05-09T01:50:44.575" v="370"/>
-          <ac:spMkLst>
-            <pc:docMk/>
-            <pc:sldMk cId="3940602935" sldId="259"/>
-            <ac:spMk id="3" creationId="{FD7D7F32-5D7E-8C67-5662-ACA05C774820}"/>
-          </ac:spMkLst>
-        </pc:spChg>
-        <pc:spChg chg="add del mod">
-          <ac:chgData name="Ho, Chloe" userId="S::hochl@dickinson.edu::2f1fe282-63b7-44b8-a16d-2d8dc8fa8de6" providerId="AD" clId="Web-{58F8AD92-E8B7-4CCA-B37B-FEE9AABF84D3}" dt="2024-05-09T01:53:03.842" v="419"/>
-          <ac:spMkLst>
-            <pc:docMk/>
-            <pc:sldMk cId="3940602935" sldId="259"/>
-            <ac:spMk id="5" creationId="{CCA82C4B-C9F7-74F3-F330-98F082A63B9A}"/>
-          </ac:spMkLst>
-        </pc:spChg>
-        <pc:spChg chg="add del">
-          <ac:chgData name="Ho, Chloe" userId="S::hochl@dickinson.edu::2f1fe282-63b7-44b8-a16d-2d8dc8fa8de6" providerId="AD" clId="Web-{58F8AD92-E8B7-4CCA-B37B-FEE9AABF84D3}" dt="2024-05-09T01:51:39.123" v="381"/>
-          <ac:spMkLst>
-            <pc:docMk/>
-            <pc:sldMk cId="3940602935" sldId="259"/>
-            <ac:spMk id="8" creationId="{1267195E-66FE-8651-ECF9-A3163F2BDDAB}"/>
-          </ac:spMkLst>
-        </pc:spChg>
-        <pc:spChg chg="add del">
-          <ac:chgData name="Ho, Chloe" userId="S::hochl@dickinson.edu::2f1fe282-63b7-44b8-a16d-2d8dc8fa8de6" providerId="AD" clId="Web-{58F8AD92-E8B7-4CCA-B37B-FEE9AABF84D3}" dt="2024-05-09T01:51:39.123" v="381"/>
-          <ac:spMkLst>
-            <pc:docMk/>
-            <pc:sldMk cId="3940602935" sldId="259"/>
-            <ac:spMk id="11" creationId="{B937640E-EF7A-4A6C-A950-D12B7D5C923E}"/>
-          </ac:spMkLst>
-        </pc:spChg>
-        <pc:spChg chg="add del">
-          <ac:chgData name="Ho, Chloe" userId="S::hochl@dickinson.edu::2f1fe282-63b7-44b8-a16d-2d8dc8fa8de6" providerId="AD" clId="Web-{58F8AD92-E8B7-4CCA-B37B-FEE9AABF84D3}" dt="2024-05-09T01:51:39.123" v="381"/>
-          <ac:spMkLst>
-            <pc:docMk/>
-            <pc:sldMk cId="3940602935" sldId="259"/>
-            <ac:spMk id="13" creationId="{37C48F90-AFD5-4232-AE7D-27B956BF7EC5}"/>
-          </ac:spMkLst>
-        </pc:spChg>
-        <pc:spChg chg="add del">
-          <ac:chgData name="Ho, Chloe" userId="S::hochl@dickinson.edu::2f1fe282-63b7-44b8-a16d-2d8dc8fa8de6" providerId="AD" clId="Web-{58F8AD92-E8B7-4CCA-B37B-FEE9AABF84D3}" dt="2024-05-09T01:51:39.123" v="381"/>
-          <ac:spMkLst>
-            <pc:docMk/>
-            <pc:sldMk cId="3940602935" sldId="259"/>
-            <ac:spMk id="15" creationId="{73C96EE1-9524-4300-BFAC-56AA55EB495C}"/>
-          </ac:spMkLst>
-        </pc:spChg>
-        <pc:spChg chg="add del">
-          <ac:chgData name="Ho, Chloe" userId="S::hochl@dickinson.edu::2f1fe282-63b7-44b8-a16d-2d8dc8fa8de6" providerId="AD" clId="Web-{58F8AD92-E8B7-4CCA-B37B-FEE9AABF84D3}" dt="2024-05-09T01:51:45.044" v="383"/>
-          <ac:spMkLst>
-            <pc:docMk/>
-            <pc:sldMk cId="3940602935" sldId="259"/>
-            <ac:spMk id="20" creationId="{042E603F-28B7-4831-BF23-65FBAB13D5FB}"/>
-          </ac:spMkLst>
-        </pc:spChg>
-        <pc:spChg chg="add del">
-          <ac:chgData name="Ho, Chloe" userId="S::hochl@dickinson.edu::2f1fe282-63b7-44b8-a16d-2d8dc8fa8de6" providerId="AD" clId="Web-{58F8AD92-E8B7-4CCA-B37B-FEE9AABF84D3}" dt="2024-05-09T01:51:45.044" v="383"/>
-          <ac:spMkLst>
-            <pc:docMk/>
-            <pc:sldMk cId="3940602935" sldId="259"/>
-            <ac:spMk id="22" creationId="{4D39700F-2B10-4402-A7DD-06EE2245880D}"/>
-          </ac:spMkLst>
-        </pc:spChg>
-        <pc:spChg chg="add del">
-          <ac:chgData name="Ho, Chloe" userId="S::hochl@dickinson.edu::2f1fe282-63b7-44b8-a16d-2d8dc8fa8de6" providerId="AD" clId="Web-{58F8AD92-E8B7-4CCA-B37B-FEE9AABF84D3}" dt="2024-05-09T01:51:45.044" v="383"/>
-          <ac:spMkLst>
-            <pc:docMk/>
-            <pc:sldMk cId="3940602935" sldId="259"/>
-            <ac:spMk id="24" creationId="{31BC8F63-97F8-423D-89DA-297A1A408EF8}"/>
-          </ac:spMkLst>
-        </pc:spChg>
-        <pc:spChg chg="add del">
-          <ac:chgData name="Ho, Chloe" userId="S::hochl@dickinson.edu::2f1fe282-63b7-44b8-a16d-2d8dc8fa8de6" providerId="AD" clId="Web-{58F8AD92-E8B7-4CCA-B37B-FEE9AABF84D3}" dt="2024-05-09T01:51:45.044" v="383"/>
-          <ac:spMkLst>
-            <pc:docMk/>
-            <pc:sldMk cId="3940602935" sldId="259"/>
-            <ac:spMk id="26" creationId="{3BBAB87D-2851-4F58-8AE4-FCF1D7413598}"/>
-          </ac:spMkLst>
-        </pc:spChg>
-        <pc:spChg chg="add del">
-          <ac:chgData name="Ho, Chloe" userId="S::hochl@dickinson.edu::2f1fe282-63b7-44b8-a16d-2d8dc8fa8de6" providerId="AD" clId="Web-{58F8AD92-E8B7-4CCA-B37B-FEE9AABF84D3}" dt="2024-05-09T01:51:45.044" v="383"/>
-          <ac:spMkLst>
-            <pc:docMk/>
-            <pc:sldMk cId="3940602935" sldId="259"/>
-            <ac:spMk id="28" creationId="{396CFDFE-8E78-4E0B-8719-596F3ACB92F6}"/>
-          </ac:spMkLst>
-        </pc:spChg>
-        <pc:spChg chg="add mod">
-          <ac:chgData name="Ho, Chloe" userId="S::hochl@dickinson.edu::2f1fe282-63b7-44b8-a16d-2d8dc8fa8de6" providerId="AD" clId="Web-{58F8AD92-E8B7-4CCA-B37B-FEE9AABF84D3}" dt="2024-05-09T01:54:32.311" v="435"/>
-          <ac:spMkLst>
-            <pc:docMk/>
-            <pc:sldMk cId="3940602935" sldId="259"/>
-            <ac:spMk id="32" creationId="{40CDB9B7-1B00-FEC3-E79A-77B988ED7EF0}"/>
-          </ac:spMkLst>
-        </pc:spChg>
-        <pc:spChg chg="add del">
-          <ac:chgData name="Ho, Chloe" userId="S::hochl@dickinson.edu::2f1fe282-63b7-44b8-a16d-2d8dc8fa8de6" providerId="AD" clId="Web-{58F8AD92-E8B7-4CCA-B37B-FEE9AABF84D3}" dt="2024-05-09T01:52:12.701" v="390"/>
-          <ac:spMkLst>
-            <pc:docMk/>
-            <pc:sldMk cId="3940602935" sldId="259"/>
-            <ac:spMk id="35" creationId="{B937640E-EF7A-4A6C-A950-D12B7D5C923E}"/>
-          </ac:spMkLst>
-        </pc:spChg>
-        <pc:spChg chg="add del">
-          <ac:chgData name="Ho, Chloe" userId="S::hochl@dickinson.edu::2f1fe282-63b7-44b8-a16d-2d8dc8fa8de6" providerId="AD" clId="Web-{58F8AD92-E8B7-4CCA-B37B-FEE9AABF84D3}" dt="2024-05-09T01:52:12.701" v="390"/>
-          <ac:spMkLst>
-            <pc:docMk/>
-            <pc:sldMk cId="3940602935" sldId="259"/>
-            <ac:spMk id="37" creationId="{4E64E4A9-D8D0-4AE7-99BD-EFE51D6EB122}"/>
-          </ac:spMkLst>
-        </pc:spChg>
-        <pc:spChg chg="add del">
-          <ac:chgData name="Ho, Chloe" userId="S::hochl@dickinson.edu::2f1fe282-63b7-44b8-a16d-2d8dc8fa8de6" providerId="AD" clId="Web-{58F8AD92-E8B7-4CCA-B37B-FEE9AABF84D3}" dt="2024-05-09T01:52:12.701" v="390"/>
-          <ac:spMkLst>
-            <pc:docMk/>
-            <pc:sldMk cId="3940602935" sldId="259"/>
-            <ac:spMk id="39" creationId="{AFD62F46-8DC3-4EDF-BDEF-27C439C6F7BD}"/>
-          </ac:spMkLst>
-        </pc:spChg>
-        <pc:spChg chg="add del">
-          <ac:chgData name="Ho, Chloe" userId="S::hochl@dickinson.edu::2f1fe282-63b7-44b8-a16d-2d8dc8fa8de6" providerId="AD" clId="Web-{58F8AD92-E8B7-4CCA-B37B-FEE9AABF84D3}" dt="2024-05-09T01:52:24.263" v="394"/>
-          <ac:spMkLst>
-            <pc:docMk/>
-            <pc:sldMk cId="3940602935" sldId="259"/>
-            <ac:spMk id="44" creationId="{B937640E-EF7A-4A6C-A950-D12B7D5C923E}"/>
-          </ac:spMkLst>
-        </pc:spChg>
-        <pc:spChg chg="add del">
-          <ac:chgData name="Ho, Chloe" userId="S::hochl@dickinson.edu::2f1fe282-63b7-44b8-a16d-2d8dc8fa8de6" providerId="AD" clId="Web-{58F8AD92-E8B7-4CCA-B37B-FEE9AABF84D3}" dt="2024-05-09T01:52:24.263" v="394"/>
-          <ac:spMkLst>
-            <pc:docMk/>
-            <pc:sldMk cId="3940602935" sldId="259"/>
-            <ac:spMk id="46" creationId="{76ADA084-C86B-4F3C-8077-6A8999CC4632}"/>
-          </ac:spMkLst>
-        </pc:spChg>
-        <pc:spChg chg="add del">
-          <ac:chgData name="Ho, Chloe" userId="S::hochl@dickinson.edu::2f1fe282-63b7-44b8-a16d-2d8dc8fa8de6" providerId="AD" clId="Web-{58F8AD92-E8B7-4CCA-B37B-FEE9AABF84D3}" dt="2024-05-09T01:54:32.311" v="435"/>
-          <ac:spMkLst>
-            <pc:docMk/>
-            <pc:sldMk cId="3940602935" sldId="259"/>
-            <ac:spMk id="51" creationId="{B937640E-EF7A-4A6C-A950-D12B7D5C923E}"/>
-          </ac:spMkLst>
-        </pc:spChg>
-        <pc:spChg chg="add del">
-          <ac:chgData name="Ho, Chloe" userId="S::hochl@dickinson.edu::2f1fe282-63b7-44b8-a16d-2d8dc8fa8de6" providerId="AD" clId="Web-{58F8AD92-E8B7-4CCA-B37B-FEE9AABF84D3}" dt="2024-05-09T01:54:32.311" v="435"/>
-          <ac:spMkLst>
-            <pc:docMk/>
-            <pc:sldMk cId="3940602935" sldId="259"/>
-            <ac:spMk id="53" creationId="{37C48F90-AFD5-4232-AE7D-27B956BF7EC5}"/>
-          </ac:spMkLst>
-        </pc:spChg>
-        <pc:spChg chg="add del">
-          <ac:chgData name="Ho, Chloe" userId="S::hochl@dickinson.edu::2f1fe282-63b7-44b8-a16d-2d8dc8fa8de6" providerId="AD" clId="Web-{58F8AD92-E8B7-4CCA-B37B-FEE9AABF84D3}" dt="2024-05-09T01:54:32.311" v="435"/>
-          <ac:spMkLst>
-            <pc:docMk/>
-            <pc:sldMk cId="3940602935" sldId="259"/>
-            <ac:spMk id="55" creationId="{73C96EE1-9524-4300-BFAC-56AA55EB495C}"/>
-          </ac:spMkLst>
-        </pc:spChg>
-        <pc:spChg chg="add">
-          <ac:chgData name="Ho, Chloe" userId="S::hochl@dickinson.edu::2f1fe282-63b7-44b8-a16d-2d8dc8fa8de6" providerId="AD" clId="Web-{58F8AD92-E8B7-4CCA-B37B-FEE9AABF84D3}" dt="2024-05-09T01:54:32.311" v="435"/>
-          <ac:spMkLst>
-            <pc:docMk/>
-            <pc:sldMk cId="3940602935" sldId="259"/>
-            <ac:spMk id="60" creationId="{B937640E-EF7A-4A6C-A950-D12B7D5C923E}"/>
-          </ac:spMkLst>
-        </pc:spChg>
-        <pc:spChg chg="add">
-          <ac:chgData name="Ho, Chloe" userId="S::hochl@dickinson.edu::2f1fe282-63b7-44b8-a16d-2d8dc8fa8de6" providerId="AD" clId="Web-{58F8AD92-E8B7-4CCA-B37B-FEE9AABF84D3}" dt="2024-05-09T01:54:32.311" v="435"/>
-          <ac:spMkLst>
-            <pc:docMk/>
-            <pc:sldMk cId="3940602935" sldId="259"/>
-            <ac:spMk id="62" creationId="{37C48F90-AFD5-4232-AE7D-27B956BF7EC5}"/>
-          </ac:spMkLst>
-        </pc:spChg>
-        <pc:spChg chg="add">
-          <ac:chgData name="Ho, Chloe" userId="S::hochl@dickinson.edu::2f1fe282-63b7-44b8-a16d-2d8dc8fa8de6" providerId="AD" clId="Web-{58F8AD92-E8B7-4CCA-B37B-FEE9AABF84D3}" dt="2024-05-09T01:54:32.311" v="435"/>
-          <ac:spMkLst>
-            <pc:docMk/>
-            <pc:sldMk cId="3940602935" sldId="259"/>
-            <ac:spMk id="64" creationId="{73C96EE1-9524-4300-BFAC-56AA55EB495C}"/>
-          </ac:spMkLst>
-        </pc:spChg>
-        <pc:picChg chg="add del mod ord">
-          <ac:chgData name="Ho, Chloe" userId="S::hochl@dickinson.edu::2f1fe282-63b7-44b8-a16d-2d8dc8fa8de6" providerId="AD" clId="Web-{58F8AD92-E8B7-4CCA-B37B-FEE9AABF84D3}" dt="2024-05-09T01:53:42.076" v="422"/>
-          <ac:picMkLst>
-            <pc:docMk/>
-            <pc:sldMk cId="3940602935" sldId="259"/>
-            <ac:picMk id="4" creationId="{2DF9D4F6-807C-D2CC-9F2B-CC4CCAA8F146}"/>
-          </ac:picMkLst>
-        </pc:picChg>
-        <pc:picChg chg="add mod">
-          <ac:chgData name="Ho, Chloe" userId="S::hochl@dickinson.edu::2f1fe282-63b7-44b8-a16d-2d8dc8fa8de6" providerId="AD" clId="Web-{58F8AD92-E8B7-4CCA-B37B-FEE9AABF84D3}" dt="2024-05-09T01:54:32.311" v="435"/>
-          <ac:picMkLst>
-            <pc:docMk/>
-            <pc:sldMk cId="3940602935" sldId="259"/>
-            <ac:picMk id="6" creationId="{860A83F5-E184-C839-D0AD-0D2F2BC61C23}"/>
-          </ac:picMkLst>
-        </pc:picChg>
-      </pc:sldChg>
-      <pc:sldChg chg="addSp delSp modSp new">
-        <pc:chgData name="Ho, Chloe" userId="S::hochl@dickinson.edu::2f1fe282-63b7-44b8-a16d-2d8dc8fa8de6" providerId="AD" clId="Web-{58F8AD92-E8B7-4CCA-B37B-FEE9AABF84D3}" dt="2024-05-09T01:58:59.093" v="515" actId="1076"/>
-        <pc:sldMkLst>
-          <pc:docMk/>
-          <pc:sldMk cId="1665873311" sldId="260"/>
-        </pc:sldMkLst>
-        <pc:spChg chg="mod">
-          <ac:chgData name="Ho, Chloe" userId="S::hochl@dickinson.edu::2f1fe282-63b7-44b8-a16d-2d8dc8fa8de6" providerId="AD" clId="Web-{58F8AD92-E8B7-4CCA-B37B-FEE9AABF84D3}" dt="2024-05-09T01:58:21.718" v="505" actId="1076"/>
-          <ac:spMkLst>
-            <pc:docMk/>
-            <pc:sldMk cId="1665873311" sldId="260"/>
-            <ac:spMk id="2" creationId="{44316FE5-4E2E-937A-16E5-4730E8DF97EC}"/>
-          </ac:spMkLst>
-        </pc:spChg>
-        <pc:spChg chg="del">
-          <ac:chgData name="Ho, Chloe" userId="S::hochl@dickinson.edu::2f1fe282-63b7-44b8-a16d-2d8dc8fa8de6" providerId="AD" clId="Web-{58F8AD92-E8B7-4CCA-B37B-FEE9AABF84D3}" dt="2024-05-09T01:56:50.420" v="474"/>
-          <ac:spMkLst>
-            <pc:docMk/>
-            <pc:sldMk cId="1665873311" sldId="260"/>
-            <ac:spMk id="3" creationId="{D7F8843F-5160-B5E8-3313-DB0B89B8A418}"/>
-          </ac:spMkLst>
-        </pc:spChg>
-        <pc:spChg chg="add del mod">
-          <ac:chgData name="Ho, Chloe" userId="S::hochl@dickinson.edu::2f1fe282-63b7-44b8-a16d-2d8dc8fa8de6" providerId="AD" clId="Web-{58F8AD92-E8B7-4CCA-B37B-FEE9AABF84D3}" dt="2024-05-09T01:58:08.593" v="501"/>
-          <ac:spMkLst>
-            <pc:docMk/>
-            <pc:sldMk cId="1665873311" sldId="260"/>
-            <ac:spMk id="6" creationId="{A6E82738-9F99-2076-18DE-E8A56616365A}"/>
-          </ac:spMkLst>
-        </pc:spChg>
-        <pc:spChg chg="add mod">
-          <ac:chgData name="Ho, Chloe" userId="S::hochl@dickinson.edu::2f1fe282-63b7-44b8-a16d-2d8dc8fa8de6" providerId="AD" clId="Web-{58F8AD92-E8B7-4CCA-B37B-FEE9AABF84D3}" dt="2024-05-09T01:58:47.515" v="511"/>
-          <ac:spMkLst>
-            <pc:docMk/>
-            <pc:sldMk cId="1665873311" sldId="260"/>
-            <ac:spMk id="12" creationId="{18FA869C-5D45-01B4-BCC8-55FDA5255A21}"/>
-          </ac:spMkLst>
-        </pc:spChg>
-        <pc:picChg chg="add del mod ord">
-          <ac:chgData name="Ho, Chloe" userId="S::hochl@dickinson.edu::2f1fe282-63b7-44b8-a16d-2d8dc8fa8de6" providerId="AD" clId="Web-{58F8AD92-E8B7-4CCA-B37B-FEE9AABF84D3}" dt="2024-05-09T01:56:57.249" v="477"/>
-          <ac:picMkLst>
-            <pc:docMk/>
-            <pc:sldMk cId="1665873311" sldId="260"/>
-            <ac:picMk id="4" creationId="{761D32D3-F3A3-58B1-AE58-CADD9D03B0C4}"/>
-          </ac:picMkLst>
-        </pc:picChg>
-        <pc:picChg chg="add del mod ord">
-          <ac:chgData name="Ho, Chloe" userId="S::hochl@dickinson.edu::2f1fe282-63b7-44b8-a16d-2d8dc8fa8de6" providerId="AD" clId="Web-{58F8AD92-E8B7-4CCA-B37B-FEE9AABF84D3}" dt="2024-05-09T01:58:47.515" v="511"/>
-          <ac:picMkLst>
-            <pc:docMk/>
-            <pc:sldMk cId="1665873311" sldId="260"/>
-            <ac:picMk id="7" creationId="{E312E8B2-9BCA-B9A8-CD7C-9B7ED642BD97}"/>
-          </ac:picMkLst>
-        </pc:picChg>
-        <pc:picChg chg="add del">
-          <ac:chgData name="Ho, Chloe" userId="S::hochl@dickinson.edu::2f1fe282-63b7-44b8-a16d-2d8dc8fa8de6" providerId="AD" clId="Web-{58F8AD92-E8B7-4CCA-B37B-FEE9AABF84D3}" dt="2024-05-09T01:58:44.546" v="509"/>
-          <ac:picMkLst>
-            <pc:docMk/>
-            <pc:sldMk cId="1665873311" sldId="260"/>
-            <ac:picMk id="9" creationId="{D7D3CEDC-08F8-CBEF-9B55-4377A7F925E9}"/>
-          </ac:picMkLst>
-        </pc:picChg>
-        <pc:picChg chg="add mod">
-          <ac:chgData name="Ho, Chloe" userId="S::hochl@dickinson.edu::2f1fe282-63b7-44b8-a16d-2d8dc8fa8de6" providerId="AD" clId="Web-{58F8AD92-E8B7-4CCA-B37B-FEE9AABF84D3}" dt="2024-05-09T01:58:59.093" v="515" actId="1076"/>
-          <ac:picMkLst>
-            <pc:docMk/>
-            <pc:sldMk cId="1665873311" sldId="260"/>
-            <ac:picMk id="10" creationId="{D70BEC6C-9B61-2193-FF96-5EB2B041F8AB}"/>
-          </ac:picMkLst>
-        </pc:picChg>
-      </pc:sldChg>
-      <pc:sldChg chg="addSp delSp modSp new mod setBg">
-        <pc:chgData name="Ho, Chloe" userId="S::hochl@dickinson.edu::2f1fe282-63b7-44b8-a16d-2d8dc8fa8de6" providerId="AD" clId="Web-{58F8AD92-E8B7-4CCA-B37B-FEE9AABF84D3}" dt="2024-05-09T01:56:23.155" v="473" actId="14100"/>
-        <pc:sldMkLst>
-          <pc:docMk/>
-          <pc:sldMk cId="2208759988" sldId="261"/>
-        </pc:sldMkLst>
-        <pc:spChg chg="mod">
-          <ac:chgData name="Ho, Chloe" userId="S::hochl@dickinson.edu::2f1fe282-63b7-44b8-a16d-2d8dc8fa8de6" providerId="AD" clId="Web-{58F8AD92-E8B7-4CCA-B37B-FEE9AABF84D3}" dt="2024-05-09T01:55:46.561" v="461"/>
-          <ac:spMkLst>
-            <pc:docMk/>
-            <pc:sldMk cId="2208759988" sldId="261"/>
-            <ac:spMk id="2" creationId="{2085CC7F-27D8-EC6A-FC83-09E58D1428B6}"/>
-          </ac:spMkLst>
-        </pc:spChg>
-        <pc:spChg chg="del">
-          <ac:chgData name="Ho, Chloe" userId="S::hochl@dickinson.edu::2f1fe282-63b7-44b8-a16d-2d8dc8fa8de6" providerId="AD" clId="Web-{58F8AD92-E8B7-4CCA-B37B-FEE9AABF84D3}" dt="2024-05-09T01:55:04.154" v="452"/>
-          <ac:spMkLst>
-            <pc:docMk/>
-            <pc:sldMk cId="2208759988" sldId="261"/>
-            <ac:spMk id="3" creationId="{224DBEC5-7DA3-40E5-05EE-157E64B75C12}"/>
-          </ac:spMkLst>
-        </pc:spChg>
-        <pc:spChg chg="add del mod">
-          <ac:chgData name="Ho, Chloe" userId="S::hochl@dickinson.edu::2f1fe282-63b7-44b8-a16d-2d8dc8fa8de6" providerId="AD" clId="Web-{58F8AD92-E8B7-4CCA-B37B-FEE9AABF84D3}" dt="2024-05-09T01:55:11.076" v="455"/>
-          <ac:spMkLst>
-            <pc:docMk/>
-            <pc:sldMk cId="2208759988" sldId="261"/>
-            <ac:spMk id="6" creationId="{29DAB8F1-6BDD-8207-7F27-6828D1B896DD}"/>
-          </ac:spMkLst>
-        </pc:spChg>
-        <pc:spChg chg="add">
-          <ac:chgData name="Ho, Chloe" userId="S::hochl@dickinson.edu::2f1fe282-63b7-44b8-a16d-2d8dc8fa8de6" providerId="AD" clId="Web-{58F8AD92-E8B7-4CCA-B37B-FEE9AABF84D3}" dt="2024-05-09T01:55:46.561" v="461"/>
-          <ac:spMkLst>
-            <pc:docMk/>
-            <pc:sldMk cId="2208759988" sldId="261"/>
-            <ac:spMk id="13" creationId="{042E603F-28B7-4831-BF23-65FBAB13D5FB}"/>
-          </ac:spMkLst>
-        </pc:spChg>
-        <pc:spChg chg="add">
-          <ac:chgData name="Ho, Chloe" userId="S::hochl@dickinson.edu::2f1fe282-63b7-44b8-a16d-2d8dc8fa8de6" providerId="AD" clId="Web-{58F8AD92-E8B7-4CCA-B37B-FEE9AABF84D3}" dt="2024-05-09T01:55:46.561" v="461"/>
-          <ac:spMkLst>
-            <pc:docMk/>
-            <pc:sldMk cId="2208759988" sldId="261"/>
-            <ac:spMk id="15" creationId="{4D39700F-2B10-4402-A7DD-06EE2245880D}"/>
-          </ac:spMkLst>
-        </pc:spChg>
-        <pc:spChg chg="add">
-          <ac:chgData name="Ho, Chloe" userId="S::hochl@dickinson.edu::2f1fe282-63b7-44b8-a16d-2d8dc8fa8de6" providerId="AD" clId="Web-{58F8AD92-E8B7-4CCA-B37B-FEE9AABF84D3}" dt="2024-05-09T01:55:46.561" v="461"/>
-          <ac:spMkLst>
-            <pc:docMk/>
-            <pc:sldMk cId="2208759988" sldId="261"/>
-            <ac:spMk id="17" creationId="{6DA65B90-7B06-4499-91BA-CDDD36132481}"/>
-          </ac:spMkLst>
-        </pc:spChg>
-        <pc:spChg chg="add">
-          <ac:chgData name="Ho, Chloe" userId="S::hochl@dickinson.edu::2f1fe282-63b7-44b8-a16d-2d8dc8fa8de6" providerId="AD" clId="Web-{58F8AD92-E8B7-4CCA-B37B-FEE9AABF84D3}" dt="2024-05-09T01:55:46.561" v="461"/>
-          <ac:spMkLst>
-            <pc:docMk/>
-            <pc:sldMk cId="2208759988" sldId="261"/>
-            <ac:spMk id="19" creationId="{C8BF742A-50EF-4EE9-855D-53E511F86F22}"/>
-          </ac:spMkLst>
-        </pc:spChg>
-        <pc:spChg chg="add">
-          <ac:chgData name="Ho, Chloe" userId="S::hochl@dickinson.edu::2f1fe282-63b7-44b8-a16d-2d8dc8fa8de6" providerId="AD" clId="Web-{58F8AD92-E8B7-4CCA-B37B-FEE9AABF84D3}" dt="2024-05-09T01:55:46.561" v="461"/>
-          <ac:spMkLst>
-            <pc:docMk/>
-            <pc:sldMk cId="2208759988" sldId="261"/>
-            <ac:spMk id="21" creationId="{7EF79062-B5BB-45DF-810C-95A324A9D60F}"/>
-          </ac:spMkLst>
-        </pc:spChg>
-        <pc:picChg chg="add del mod ord">
-          <ac:chgData name="Ho, Chloe" userId="S::hochl@dickinson.edu::2f1fe282-63b7-44b8-a16d-2d8dc8fa8de6" providerId="AD" clId="Web-{58F8AD92-E8B7-4CCA-B37B-FEE9AABF84D3}" dt="2024-05-09T01:55:08.904" v="454"/>
-          <ac:picMkLst>
-            <pc:docMk/>
-            <pc:sldMk cId="2208759988" sldId="261"/>
-            <ac:picMk id="4" creationId="{51C034C1-22E7-879A-B0BB-0DDC46D0EF00}"/>
-          </ac:picMkLst>
-        </pc:picChg>
-        <pc:picChg chg="add mod ord modCrop">
-          <ac:chgData name="Ho, Chloe" userId="S::hochl@dickinson.edu::2f1fe282-63b7-44b8-a16d-2d8dc8fa8de6" providerId="AD" clId="Web-{58F8AD92-E8B7-4CCA-B37B-FEE9AABF84D3}" dt="2024-05-09T01:56:23.155" v="473" actId="14100"/>
-          <ac:picMkLst>
-            <pc:docMk/>
-            <pc:sldMk cId="2208759988" sldId="261"/>
-            <ac:picMk id="7" creationId="{2F517C96-0989-6861-C1AB-C6CECC6DFE4A}"/>
-          </ac:picMkLst>
-        </pc:picChg>
-        <pc:picChg chg="add mod">
-          <ac:chgData name="Ho, Chloe" userId="S::hochl@dickinson.edu::2f1fe282-63b7-44b8-a16d-2d8dc8fa8de6" providerId="AD" clId="Web-{58F8AD92-E8B7-4CCA-B37B-FEE9AABF84D3}" dt="2024-05-09T01:56:18.498" v="472" actId="14100"/>
-          <ac:picMkLst>
-            <pc:docMk/>
-            <pc:sldMk cId="2208759988" sldId="261"/>
-            <ac:picMk id="8" creationId="{D55D1063-C475-300C-F376-47BB9517D4C5}"/>
-          </ac:picMkLst>
-        </pc:picChg>
-      </pc:sldChg>
-      <pc:sldChg chg="addSp delSp modSp add replId">
-        <pc:chgData name="Ho, Chloe" userId="S::hochl@dickinson.edu::2f1fe282-63b7-44b8-a16d-2d8dc8fa8de6" providerId="AD" clId="Web-{58F8AD92-E8B7-4CCA-B37B-FEE9AABF84D3}" dt="2024-05-09T01:57:42.467" v="491" actId="1076"/>
-        <pc:sldMkLst>
-          <pc:docMk/>
-          <pc:sldMk cId="3223768952" sldId="262"/>
-        </pc:sldMkLst>
-        <pc:spChg chg="add del mod">
-          <ac:chgData name="Ho, Chloe" userId="S::hochl@dickinson.edu::2f1fe282-63b7-44b8-a16d-2d8dc8fa8de6" providerId="AD" clId="Web-{58F8AD92-E8B7-4CCA-B37B-FEE9AABF84D3}" dt="2024-05-09T01:57:13.467" v="481"/>
-          <ac:spMkLst>
-            <pc:docMk/>
-            <pc:sldMk cId="3223768952" sldId="262"/>
-            <ac:spMk id="5" creationId="{753262D6-B4B7-07BC-1A44-43760E82D99C}"/>
-          </ac:spMkLst>
-        </pc:spChg>
-        <pc:spChg chg="add del">
-          <ac:chgData name="Ho, Chloe" userId="S::hochl@dickinson.edu::2f1fe282-63b7-44b8-a16d-2d8dc8fa8de6" providerId="AD" clId="Web-{58F8AD92-E8B7-4CCA-B37B-FEE9AABF84D3}" dt="2024-05-09T01:57:27.733" v="486"/>
-          <ac:spMkLst>
-            <pc:docMk/>
-            <pc:sldMk cId="3223768952" sldId="262"/>
-            <ac:spMk id="13" creationId="{042E603F-28B7-4831-BF23-65FBAB13D5FB}"/>
-          </ac:spMkLst>
-        </pc:spChg>
-        <pc:spChg chg="add del">
-          <ac:chgData name="Ho, Chloe" userId="S::hochl@dickinson.edu::2f1fe282-63b7-44b8-a16d-2d8dc8fa8de6" providerId="AD" clId="Web-{58F8AD92-E8B7-4CCA-B37B-FEE9AABF84D3}" dt="2024-05-09T01:57:27.733" v="486"/>
-          <ac:spMkLst>
-            <pc:docMk/>
-            <pc:sldMk cId="3223768952" sldId="262"/>
-            <ac:spMk id="15" creationId="{4D39700F-2B10-4402-A7DD-06EE2245880D}"/>
-          </ac:spMkLst>
-        </pc:spChg>
-        <pc:spChg chg="add del">
-          <ac:chgData name="Ho, Chloe" userId="S::hochl@dickinson.edu::2f1fe282-63b7-44b8-a16d-2d8dc8fa8de6" providerId="AD" clId="Web-{58F8AD92-E8B7-4CCA-B37B-FEE9AABF84D3}" dt="2024-05-09T01:57:27.733" v="486"/>
-          <ac:spMkLst>
-            <pc:docMk/>
-            <pc:sldMk cId="3223768952" sldId="262"/>
-            <ac:spMk id="17" creationId="{6DA65B90-7B06-4499-91BA-CDDD36132481}"/>
-          </ac:spMkLst>
-        </pc:spChg>
-        <pc:spChg chg="add del">
-          <ac:chgData name="Ho, Chloe" userId="S::hochl@dickinson.edu::2f1fe282-63b7-44b8-a16d-2d8dc8fa8de6" providerId="AD" clId="Web-{58F8AD92-E8B7-4CCA-B37B-FEE9AABF84D3}" dt="2024-05-09T01:57:27.733" v="486"/>
-          <ac:spMkLst>
-            <pc:docMk/>
-            <pc:sldMk cId="3223768952" sldId="262"/>
-            <ac:spMk id="19" creationId="{C8BF742A-50EF-4EE9-855D-53E511F86F22}"/>
-          </ac:spMkLst>
-        </pc:spChg>
-        <pc:spChg chg="add del">
-          <ac:chgData name="Ho, Chloe" userId="S::hochl@dickinson.edu::2f1fe282-63b7-44b8-a16d-2d8dc8fa8de6" providerId="AD" clId="Web-{58F8AD92-E8B7-4CCA-B37B-FEE9AABF84D3}" dt="2024-05-09T01:57:27.733" v="486"/>
-          <ac:spMkLst>
-            <pc:docMk/>
-            <pc:sldMk cId="3223768952" sldId="262"/>
-            <ac:spMk id="21" creationId="{7EF79062-B5BB-45DF-810C-95A324A9D60F}"/>
-          </ac:spMkLst>
-        </pc:spChg>
-        <pc:spChg chg="add del">
-          <ac:chgData name="Ho, Chloe" userId="S::hochl@dickinson.edu::2f1fe282-63b7-44b8-a16d-2d8dc8fa8de6" providerId="AD" clId="Web-{58F8AD92-E8B7-4CCA-B37B-FEE9AABF84D3}" dt="2024-05-09T01:57:27.733" v="486"/>
-          <ac:spMkLst>
-            <pc:docMk/>
-            <pc:sldMk cId="3223768952" sldId="262"/>
-            <ac:spMk id="26" creationId="{042E603F-28B7-4831-BF23-65FBAB13D5FB}"/>
-          </ac:spMkLst>
-        </pc:spChg>
-        <pc:spChg chg="add del">
-          <ac:chgData name="Ho, Chloe" userId="S::hochl@dickinson.edu::2f1fe282-63b7-44b8-a16d-2d8dc8fa8de6" providerId="AD" clId="Web-{58F8AD92-E8B7-4CCA-B37B-FEE9AABF84D3}" dt="2024-05-09T01:57:27.733" v="486"/>
-          <ac:spMkLst>
-            <pc:docMk/>
-            <pc:sldMk cId="3223768952" sldId="262"/>
-            <ac:spMk id="28" creationId="{4D39700F-2B10-4402-A7DD-06EE2245880D}"/>
-          </ac:spMkLst>
-        </pc:spChg>
-        <pc:spChg chg="add del">
-          <ac:chgData name="Ho, Chloe" userId="S::hochl@dickinson.edu::2f1fe282-63b7-44b8-a16d-2d8dc8fa8de6" providerId="AD" clId="Web-{58F8AD92-E8B7-4CCA-B37B-FEE9AABF84D3}" dt="2024-05-09T01:57:27.733" v="486"/>
-          <ac:spMkLst>
-            <pc:docMk/>
-            <pc:sldMk cId="3223768952" sldId="262"/>
-            <ac:spMk id="30" creationId="{6DA65B90-7B06-4499-91BA-CDDD36132481}"/>
-          </ac:spMkLst>
-        </pc:spChg>
-        <pc:spChg chg="add del">
-          <ac:chgData name="Ho, Chloe" userId="S::hochl@dickinson.edu::2f1fe282-63b7-44b8-a16d-2d8dc8fa8de6" providerId="AD" clId="Web-{58F8AD92-E8B7-4CCA-B37B-FEE9AABF84D3}" dt="2024-05-09T01:57:27.733" v="486"/>
-          <ac:spMkLst>
-            <pc:docMk/>
-            <pc:sldMk cId="3223768952" sldId="262"/>
-            <ac:spMk id="32" creationId="{C8BF742A-50EF-4EE9-855D-53E511F86F22}"/>
-          </ac:spMkLst>
-        </pc:spChg>
-        <pc:spChg chg="add del">
-          <ac:chgData name="Ho, Chloe" userId="S::hochl@dickinson.edu::2f1fe282-63b7-44b8-a16d-2d8dc8fa8de6" providerId="AD" clId="Web-{58F8AD92-E8B7-4CCA-B37B-FEE9AABF84D3}" dt="2024-05-09T01:57:27.733" v="486"/>
-          <ac:spMkLst>
-            <pc:docMk/>
-            <pc:sldMk cId="3223768952" sldId="262"/>
-            <ac:spMk id="34" creationId="{7EF79062-B5BB-45DF-810C-95A324A9D60F}"/>
-          </ac:spMkLst>
-        </pc:spChg>
-        <pc:picChg chg="add mod ord">
-          <ac:chgData name="Ho, Chloe" userId="S::hochl@dickinson.edu::2f1fe282-63b7-44b8-a16d-2d8dc8fa8de6" providerId="AD" clId="Web-{58F8AD92-E8B7-4CCA-B37B-FEE9AABF84D3}" dt="2024-05-09T01:57:39.858" v="490" actId="1076"/>
-          <ac:picMkLst>
-            <pc:docMk/>
-            <pc:sldMk cId="3223768952" sldId="262"/>
-            <ac:picMk id="3" creationId="{5F3EEF51-FDB6-FCEB-2352-B5B82EB39C4F}"/>
-          </ac:picMkLst>
-        </pc:picChg>
-        <pc:picChg chg="add mod ord">
-          <ac:chgData name="Ho, Chloe" userId="S::hochl@dickinson.edu::2f1fe282-63b7-44b8-a16d-2d8dc8fa8de6" providerId="AD" clId="Web-{58F8AD92-E8B7-4CCA-B37B-FEE9AABF84D3}" dt="2024-05-09T01:57:42.467" v="491" actId="1076"/>
-          <ac:picMkLst>
-            <pc:docMk/>
-            <pc:sldMk cId="3223768952" sldId="262"/>
-            <ac:picMk id="6" creationId="{830456BB-5069-CB04-5C25-A69D6F185ECC}"/>
-          </ac:picMkLst>
-        </pc:picChg>
-        <pc:picChg chg="del">
-          <ac:chgData name="Ho, Chloe" userId="S::hochl@dickinson.edu::2f1fe282-63b7-44b8-a16d-2d8dc8fa8de6" providerId="AD" clId="Web-{58F8AD92-E8B7-4CCA-B37B-FEE9AABF84D3}" dt="2024-05-09T01:57:01.452" v="480"/>
-          <ac:picMkLst>
-            <pc:docMk/>
-            <pc:sldMk cId="3223768952" sldId="262"/>
-            <ac:picMk id="7" creationId="{2F517C96-0989-6861-C1AB-C6CECC6DFE4A}"/>
-          </ac:picMkLst>
-        </pc:picChg>
-        <pc:picChg chg="del">
-          <ac:chgData name="Ho, Chloe" userId="S::hochl@dickinson.edu::2f1fe282-63b7-44b8-a16d-2d8dc8fa8de6" providerId="AD" clId="Web-{58F8AD92-E8B7-4CCA-B37B-FEE9AABF84D3}" dt="2024-05-09T01:56:54.420" v="476"/>
-          <ac:picMkLst>
-            <pc:docMk/>
-            <pc:sldMk cId="3223768952" sldId="262"/>
-            <ac:picMk id="8" creationId="{D55D1063-C475-300C-F376-47BB9517D4C5}"/>
-          </ac:picMkLst>
-        </pc:picChg>
-      </pc:sldChg>
-      <pc:sldChg chg="add replId">
-        <pc:chgData name="Ho, Chloe" userId="S::hochl@dickinson.edu::2f1fe282-63b7-44b8-a16d-2d8dc8fa8de6" providerId="AD" clId="Web-{58F8AD92-E8B7-4CCA-B37B-FEE9AABF84D3}" dt="2024-05-09T01:58:31.280" v="508"/>
-        <pc:sldMkLst>
-          <pc:docMk/>
-          <pc:sldMk cId="3685718716" sldId="263"/>
-        </pc:sldMkLst>
-      </pc:sldChg>
-      <pc:sldMasterChg chg="add del addSldLayout delSldLayout">
-        <pc:chgData name="Ho, Chloe" userId="S::hochl@dickinson.edu::2f1fe282-63b7-44b8-a16d-2d8dc8fa8de6" providerId="AD" clId="Web-{58F8AD92-E8B7-4CCA-B37B-FEE9AABF84D3}" dt="2024-05-09T01:37:44.479" v="39"/>
-        <pc:sldMasterMkLst>
-          <pc:docMk/>
-          <pc:sldMasterMk cId="2460954070" sldId="2147483660"/>
-        </pc:sldMasterMkLst>
-        <pc:sldLayoutChg chg="add del">
-          <pc:chgData name="Ho, Chloe" userId="S::hochl@dickinson.edu::2f1fe282-63b7-44b8-a16d-2d8dc8fa8de6" providerId="AD" clId="Web-{58F8AD92-E8B7-4CCA-B37B-FEE9AABF84D3}" dt="2024-05-09T01:37:44.479" v="39"/>
-          <pc:sldLayoutMkLst>
-            <pc:docMk/>
-            <pc:sldMasterMk cId="2460954070" sldId="2147483660"/>
-            <pc:sldLayoutMk cId="2385387890" sldId="2147483661"/>
-          </pc:sldLayoutMkLst>
-        </pc:sldLayoutChg>
-        <pc:sldLayoutChg chg="add del">
-          <pc:chgData name="Ho, Chloe" userId="S::hochl@dickinson.edu::2f1fe282-63b7-44b8-a16d-2d8dc8fa8de6" providerId="AD" clId="Web-{58F8AD92-E8B7-4CCA-B37B-FEE9AABF84D3}" dt="2024-05-09T01:37:44.479" v="39"/>
-          <pc:sldLayoutMkLst>
-            <pc:docMk/>
-            <pc:sldMasterMk cId="2460954070" sldId="2147483660"/>
-            <pc:sldLayoutMk cId="949138452" sldId="2147483662"/>
-          </pc:sldLayoutMkLst>
-        </pc:sldLayoutChg>
-        <pc:sldLayoutChg chg="add del">
-          <pc:chgData name="Ho, Chloe" userId="S::hochl@dickinson.edu::2f1fe282-63b7-44b8-a16d-2d8dc8fa8de6" providerId="AD" clId="Web-{58F8AD92-E8B7-4CCA-B37B-FEE9AABF84D3}" dt="2024-05-09T01:37:44.479" v="39"/>
-          <pc:sldLayoutMkLst>
-            <pc:docMk/>
-            <pc:sldMasterMk cId="2460954070" sldId="2147483660"/>
-            <pc:sldLayoutMk cId="2591524520" sldId="2147483663"/>
-          </pc:sldLayoutMkLst>
-        </pc:sldLayoutChg>
-        <pc:sldLayoutChg chg="add del">
-          <pc:chgData name="Ho, Chloe" userId="S::hochl@dickinson.edu::2f1fe282-63b7-44b8-a16d-2d8dc8fa8de6" providerId="AD" clId="Web-{58F8AD92-E8B7-4CCA-B37B-FEE9AABF84D3}" dt="2024-05-09T01:37:44.479" v="39"/>
-          <pc:sldLayoutMkLst>
-            <pc:docMk/>
-            <pc:sldMasterMk cId="2460954070" sldId="2147483660"/>
-            <pc:sldLayoutMk cId="1203092039" sldId="2147483664"/>
-          </pc:sldLayoutMkLst>
-        </pc:sldLayoutChg>
-        <pc:sldLayoutChg chg="add del">
-          <pc:chgData name="Ho, Chloe" userId="S::hochl@dickinson.edu::2f1fe282-63b7-44b8-a16d-2d8dc8fa8de6" providerId="AD" clId="Web-{58F8AD92-E8B7-4CCA-B37B-FEE9AABF84D3}" dt="2024-05-09T01:37:44.479" v="39"/>
-          <pc:sldLayoutMkLst>
-            <pc:docMk/>
-            <pc:sldMasterMk cId="2460954070" sldId="2147483660"/>
-            <pc:sldLayoutMk cId="3733172339" sldId="2147483665"/>
-          </pc:sldLayoutMkLst>
-        </pc:sldLayoutChg>
-        <pc:sldLayoutChg chg="add del">
-          <pc:chgData name="Ho, Chloe" userId="S::hochl@dickinson.edu::2f1fe282-63b7-44b8-a16d-2d8dc8fa8de6" providerId="AD" clId="Web-{58F8AD92-E8B7-4CCA-B37B-FEE9AABF84D3}" dt="2024-05-09T01:37:44.479" v="39"/>
-          <pc:sldLayoutMkLst>
-            <pc:docMk/>
-            <pc:sldMasterMk cId="2460954070" sldId="2147483660"/>
-            <pc:sldLayoutMk cId="3210312558" sldId="2147483666"/>
-          </pc:sldLayoutMkLst>
-        </pc:sldLayoutChg>
-        <pc:sldLayoutChg chg="add del">
-          <pc:chgData name="Ho, Chloe" userId="S::hochl@dickinson.edu::2f1fe282-63b7-44b8-a16d-2d8dc8fa8de6" providerId="AD" clId="Web-{58F8AD92-E8B7-4CCA-B37B-FEE9AABF84D3}" dt="2024-05-09T01:37:44.479" v="39"/>
-          <pc:sldLayoutMkLst>
-            <pc:docMk/>
-            <pc:sldMasterMk cId="2460954070" sldId="2147483660"/>
-            <pc:sldLayoutMk cId="3146388984" sldId="2147483667"/>
-          </pc:sldLayoutMkLst>
-        </pc:sldLayoutChg>
-        <pc:sldLayoutChg chg="add del">
-          <pc:chgData name="Ho, Chloe" userId="S::hochl@dickinson.edu::2f1fe282-63b7-44b8-a16d-2d8dc8fa8de6" providerId="AD" clId="Web-{58F8AD92-E8B7-4CCA-B37B-FEE9AABF84D3}" dt="2024-05-09T01:37:44.479" v="39"/>
-          <pc:sldLayoutMkLst>
-            <pc:docMk/>
-            <pc:sldMasterMk cId="2460954070" sldId="2147483660"/>
-            <pc:sldLayoutMk cId="3171841454" sldId="2147483668"/>
-          </pc:sldLayoutMkLst>
-        </pc:sldLayoutChg>
-        <pc:sldLayoutChg chg="add del">
-          <pc:chgData name="Ho, Chloe" userId="S::hochl@dickinson.edu::2f1fe282-63b7-44b8-a16d-2d8dc8fa8de6" providerId="AD" clId="Web-{58F8AD92-E8B7-4CCA-B37B-FEE9AABF84D3}" dt="2024-05-09T01:37:44.479" v="39"/>
-          <pc:sldLayoutMkLst>
-            <pc:docMk/>
-            <pc:sldMasterMk cId="2460954070" sldId="2147483660"/>
-            <pc:sldLayoutMk cId="1718958274" sldId="2147483669"/>
-          </pc:sldLayoutMkLst>
-        </pc:sldLayoutChg>
-        <pc:sldLayoutChg chg="add del">
-          <pc:chgData name="Ho, Chloe" userId="S::hochl@dickinson.edu::2f1fe282-63b7-44b8-a16d-2d8dc8fa8de6" providerId="AD" clId="Web-{58F8AD92-E8B7-4CCA-B37B-FEE9AABF84D3}" dt="2024-05-09T01:37:44.479" v="39"/>
-          <pc:sldLayoutMkLst>
-            <pc:docMk/>
-            <pc:sldMasterMk cId="2460954070" sldId="2147483660"/>
-            <pc:sldLayoutMk cId="2202905451" sldId="2147483670"/>
-          </pc:sldLayoutMkLst>
-        </pc:sldLayoutChg>
-        <pc:sldLayoutChg chg="add del">
-          <pc:chgData name="Ho, Chloe" userId="S::hochl@dickinson.edu::2f1fe282-63b7-44b8-a16d-2d8dc8fa8de6" providerId="AD" clId="Web-{58F8AD92-E8B7-4CCA-B37B-FEE9AABF84D3}" dt="2024-05-09T01:37:44.479" v="39"/>
-          <pc:sldLayoutMkLst>
-            <pc:docMk/>
-            <pc:sldMasterMk cId="2460954070" sldId="2147483660"/>
-            <pc:sldLayoutMk cId="3479445657" sldId="2147483671"/>
-          </pc:sldLayoutMkLst>
-        </pc:sldLayoutChg>
-      </pc:sldMasterChg>
-      <pc:sldMasterChg chg="add del addSldLayout delSldLayout">
-        <pc:chgData name="Ho, Chloe" userId="S::hochl@dickinson.edu::2f1fe282-63b7-44b8-a16d-2d8dc8fa8de6" providerId="AD" clId="Web-{58F8AD92-E8B7-4CCA-B37B-FEE9AABF84D3}" dt="2024-05-09T01:37:26.151" v="25"/>
-        <pc:sldMasterMkLst>
-          <pc:docMk/>
-          <pc:sldMasterMk cId="2638280294" sldId="2147483685"/>
-        </pc:sldMasterMkLst>
-        <pc:sldLayoutChg chg="add del">
-          <pc:chgData name="Ho, Chloe" userId="S::hochl@dickinson.edu::2f1fe282-63b7-44b8-a16d-2d8dc8fa8de6" providerId="AD" clId="Web-{58F8AD92-E8B7-4CCA-B37B-FEE9AABF84D3}" dt="2024-05-09T01:37:26.151" v="25"/>
-          <pc:sldLayoutMkLst>
-            <pc:docMk/>
-            <pc:sldMasterMk cId="2638280294" sldId="2147483685"/>
-            <pc:sldLayoutMk cId="853707053" sldId="2147483674"/>
-          </pc:sldLayoutMkLst>
-        </pc:sldLayoutChg>
-        <pc:sldLayoutChg chg="add del">
-          <pc:chgData name="Ho, Chloe" userId="S::hochl@dickinson.edu::2f1fe282-63b7-44b8-a16d-2d8dc8fa8de6" providerId="AD" clId="Web-{58F8AD92-E8B7-4CCA-B37B-FEE9AABF84D3}" dt="2024-05-09T01:37:26.151" v="25"/>
-          <pc:sldLayoutMkLst>
-            <pc:docMk/>
-            <pc:sldMasterMk cId="2638280294" sldId="2147483685"/>
-            <pc:sldLayoutMk cId="909460058" sldId="2147483675"/>
-          </pc:sldLayoutMkLst>
-        </pc:sldLayoutChg>
-        <pc:sldLayoutChg chg="add del">
-          <pc:chgData name="Ho, Chloe" userId="S::hochl@dickinson.edu::2f1fe282-63b7-44b8-a16d-2d8dc8fa8de6" providerId="AD" clId="Web-{58F8AD92-E8B7-4CCA-B37B-FEE9AABF84D3}" dt="2024-05-09T01:37:26.151" v="25"/>
-          <pc:sldLayoutMkLst>
-            <pc:docMk/>
-            <pc:sldMasterMk cId="2638280294" sldId="2147483685"/>
-            <pc:sldLayoutMk cId="1023567986" sldId="2147483676"/>
-          </pc:sldLayoutMkLst>
-        </pc:sldLayoutChg>
-        <pc:sldLayoutChg chg="add del">
-          <pc:chgData name="Ho, Chloe" userId="S::hochl@dickinson.edu::2f1fe282-63b7-44b8-a16d-2d8dc8fa8de6" providerId="AD" clId="Web-{58F8AD92-E8B7-4CCA-B37B-FEE9AABF84D3}" dt="2024-05-09T01:37:26.151" v="25"/>
-          <pc:sldLayoutMkLst>
-            <pc:docMk/>
-            <pc:sldMasterMk cId="2638280294" sldId="2147483685"/>
-            <pc:sldLayoutMk cId="1921514282" sldId="2147483677"/>
-          </pc:sldLayoutMkLst>
-        </pc:sldLayoutChg>
-        <pc:sldLayoutChg chg="add del">
-          <pc:chgData name="Ho, Chloe" userId="S::hochl@dickinson.edu::2f1fe282-63b7-44b8-a16d-2d8dc8fa8de6" providerId="AD" clId="Web-{58F8AD92-E8B7-4CCA-B37B-FEE9AABF84D3}" dt="2024-05-09T01:37:26.151" v="25"/>
-          <pc:sldLayoutMkLst>
-            <pc:docMk/>
-            <pc:sldMasterMk cId="2638280294" sldId="2147483685"/>
-            <pc:sldLayoutMk cId="916724829" sldId="2147483678"/>
-          </pc:sldLayoutMkLst>
-        </pc:sldLayoutChg>
-        <pc:sldLayoutChg chg="add del">
-          <pc:chgData name="Ho, Chloe" userId="S::hochl@dickinson.edu::2f1fe282-63b7-44b8-a16d-2d8dc8fa8de6" providerId="AD" clId="Web-{58F8AD92-E8B7-4CCA-B37B-FEE9AABF84D3}" dt="2024-05-09T01:37:26.151" v="25"/>
-          <pc:sldLayoutMkLst>
-            <pc:docMk/>
-            <pc:sldMasterMk cId="2638280294" sldId="2147483685"/>
-            <pc:sldLayoutMk cId="390820951" sldId="2147483679"/>
-          </pc:sldLayoutMkLst>
-        </pc:sldLayoutChg>
-        <pc:sldLayoutChg chg="add del">
-          <pc:chgData name="Ho, Chloe" userId="S::hochl@dickinson.edu::2f1fe282-63b7-44b8-a16d-2d8dc8fa8de6" providerId="AD" clId="Web-{58F8AD92-E8B7-4CCA-B37B-FEE9AABF84D3}" dt="2024-05-09T01:37:26.151" v="25"/>
-          <pc:sldLayoutMkLst>
-            <pc:docMk/>
-            <pc:sldMasterMk cId="2638280294" sldId="2147483685"/>
-            <pc:sldLayoutMk cId="3600188537" sldId="2147483680"/>
-          </pc:sldLayoutMkLst>
-        </pc:sldLayoutChg>
-        <pc:sldLayoutChg chg="add del">
-          <pc:chgData name="Ho, Chloe" userId="S::hochl@dickinson.edu::2f1fe282-63b7-44b8-a16d-2d8dc8fa8de6" providerId="AD" clId="Web-{58F8AD92-E8B7-4CCA-B37B-FEE9AABF84D3}" dt="2024-05-09T01:37:26.151" v="25"/>
-          <pc:sldLayoutMkLst>
-            <pc:docMk/>
-            <pc:sldMasterMk cId="2638280294" sldId="2147483685"/>
-            <pc:sldLayoutMk cId="2332512112" sldId="2147483681"/>
-          </pc:sldLayoutMkLst>
-        </pc:sldLayoutChg>
-        <pc:sldLayoutChg chg="add del">
-          <pc:chgData name="Ho, Chloe" userId="S::hochl@dickinson.edu::2f1fe282-63b7-44b8-a16d-2d8dc8fa8de6" providerId="AD" clId="Web-{58F8AD92-E8B7-4CCA-B37B-FEE9AABF84D3}" dt="2024-05-09T01:37:26.151" v="25"/>
-          <pc:sldLayoutMkLst>
-            <pc:docMk/>
-            <pc:sldMasterMk cId="2638280294" sldId="2147483685"/>
-            <pc:sldLayoutMk cId="2897073631" sldId="2147483682"/>
-          </pc:sldLayoutMkLst>
-        </pc:sldLayoutChg>
-        <pc:sldLayoutChg chg="add del">
-          <pc:chgData name="Ho, Chloe" userId="S::hochl@dickinson.edu::2f1fe282-63b7-44b8-a16d-2d8dc8fa8de6" providerId="AD" clId="Web-{58F8AD92-E8B7-4CCA-B37B-FEE9AABF84D3}" dt="2024-05-09T01:37:26.151" v="25"/>
-          <pc:sldLayoutMkLst>
-            <pc:docMk/>
-            <pc:sldMasterMk cId="2638280294" sldId="2147483685"/>
-            <pc:sldLayoutMk cId="827112064" sldId="2147483683"/>
-          </pc:sldLayoutMkLst>
-        </pc:sldLayoutChg>
-        <pc:sldLayoutChg chg="add del">
-          <pc:chgData name="Ho, Chloe" userId="S::hochl@dickinson.edu::2f1fe282-63b7-44b8-a16d-2d8dc8fa8de6" providerId="AD" clId="Web-{58F8AD92-E8B7-4CCA-B37B-FEE9AABF84D3}" dt="2024-05-09T01:37:26.151" v="25"/>
-          <pc:sldLayoutMkLst>
-            <pc:docMk/>
-            <pc:sldMasterMk cId="2638280294" sldId="2147483685"/>
-            <pc:sldLayoutMk cId="3005477829" sldId="2147483684"/>
-          </pc:sldLayoutMkLst>
-        </pc:sldLayoutChg>
-      </pc:sldMasterChg>
-      <pc:sldMasterChg chg="add addSldLayout">
-        <pc:chgData name="Ho, Chloe" userId="S::hochl@dickinson.edu::2f1fe282-63b7-44b8-a16d-2d8dc8fa8de6" providerId="AD" clId="Web-{58F8AD92-E8B7-4CCA-B37B-FEE9AABF84D3}" dt="2024-05-09T01:37:44.479" v="39"/>
-        <pc:sldMasterMkLst>
-          <pc:docMk/>
-          <pc:sldMasterMk cId="3801673647" sldId="2147483763"/>
-        </pc:sldMasterMkLst>
-        <pc:sldLayoutChg chg="add">
-          <pc:chgData name="Ho, Chloe" userId="S::hochl@dickinson.edu::2f1fe282-63b7-44b8-a16d-2d8dc8fa8de6" providerId="AD" clId="Web-{58F8AD92-E8B7-4CCA-B37B-FEE9AABF84D3}" dt="2024-05-09T01:37:44.479" v="39"/>
-          <pc:sldLayoutMkLst>
-            <pc:docMk/>
-            <pc:sldMasterMk cId="3801673647" sldId="2147483763"/>
-            <pc:sldLayoutMk cId="2697081387" sldId="2147483752"/>
-          </pc:sldLayoutMkLst>
-        </pc:sldLayoutChg>
-        <pc:sldLayoutChg chg="add">
-          <pc:chgData name="Ho, Chloe" userId="S::hochl@dickinson.edu::2f1fe282-63b7-44b8-a16d-2d8dc8fa8de6" providerId="AD" clId="Web-{58F8AD92-E8B7-4CCA-B37B-FEE9AABF84D3}" dt="2024-05-09T01:37:44.479" v="39"/>
-          <pc:sldLayoutMkLst>
-            <pc:docMk/>
-            <pc:sldMasterMk cId="3801673647" sldId="2147483763"/>
-            <pc:sldLayoutMk cId="545555536" sldId="2147483753"/>
-          </pc:sldLayoutMkLst>
-        </pc:sldLayoutChg>
-        <pc:sldLayoutChg chg="add">
-          <pc:chgData name="Ho, Chloe" userId="S::hochl@dickinson.edu::2f1fe282-63b7-44b8-a16d-2d8dc8fa8de6" providerId="AD" clId="Web-{58F8AD92-E8B7-4CCA-B37B-FEE9AABF84D3}" dt="2024-05-09T01:37:44.479" v="39"/>
-          <pc:sldLayoutMkLst>
-            <pc:docMk/>
-            <pc:sldMasterMk cId="3801673647" sldId="2147483763"/>
-            <pc:sldLayoutMk cId="4062178198" sldId="2147483754"/>
-          </pc:sldLayoutMkLst>
-        </pc:sldLayoutChg>
-        <pc:sldLayoutChg chg="add">
-          <pc:chgData name="Ho, Chloe" userId="S::hochl@dickinson.edu::2f1fe282-63b7-44b8-a16d-2d8dc8fa8de6" providerId="AD" clId="Web-{58F8AD92-E8B7-4CCA-B37B-FEE9AABF84D3}" dt="2024-05-09T01:37:44.479" v="39"/>
-          <pc:sldLayoutMkLst>
-            <pc:docMk/>
-            <pc:sldMasterMk cId="3801673647" sldId="2147483763"/>
-            <pc:sldLayoutMk cId="914374809" sldId="2147483755"/>
-          </pc:sldLayoutMkLst>
-        </pc:sldLayoutChg>
-        <pc:sldLayoutChg chg="add">
-          <pc:chgData name="Ho, Chloe" userId="S::hochl@dickinson.edu::2f1fe282-63b7-44b8-a16d-2d8dc8fa8de6" providerId="AD" clId="Web-{58F8AD92-E8B7-4CCA-B37B-FEE9AABF84D3}" dt="2024-05-09T01:37:44.479" v="39"/>
-          <pc:sldLayoutMkLst>
-            <pc:docMk/>
-            <pc:sldMasterMk cId="3801673647" sldId="2147483763"/>
-            <pc:sldLayoutMk cId="2791657173" sldId="2147483756"/>
-          </pc:sldLayoutMkLst>
-        </pc:sldLayoutChg>
-        <pc:sldLayoutChg chg="add">
-          <pc:chgData name="Ho, Chloe" userId="S::hochl@dickinson.edu::2f1fe282-63b7-44b8-a16d-2d8dc8fa8de6" providerId="AD" clId="Web-{58F8AD92-E8B7-4CCA-B37B-FEE9AABF84D3}" dt="2024-05-09T01:37:44.479" v="39"/>
-          <pc:sldLayoutMkLst>
-            <pc:docMk/>
-            <pc:sldMasterMk cId="3801673647" sldId="2147483763"/>
-            <pc:sldLayoutMk cId="2470132659" sldId="2147483757"/>
-          </pc:sldLayoutMkLst>
-        </pc:sldLayoutChg>
-        <pc:sldLayoutChg chg="add">
-          <pc:chgData name="Ho, Chloe" userId="S::hochl@dickinson.edu::2f1fe282-63b7-44b8-a16d-2d8dc8fa8de6" providerId="AD" clId="Web-{58F8AD92-E8B7-4CCA-B37B-FEE9AABF84D3}" dt="2024-05-09T01:37:44.479" v="39"/>
-          <pc:sldLayoutMkLst>
-            <pc:docMk/>
-            <pc:sldMasterMk cId="3801673647" sldId="2147483763"/>
-            <pc:sldLayoutMk cId="1874527866" sldId="2147483758"/>
-          </pc:sldLayoutMkLst>
-        </pc:sldLayoutChg>
-        <pc:sldLayoutChg chg="add">
-          <pc:chgData name="Ho, Chloe" userId="S::hochl@dickinson.edu::2f1fe282-63b7-44b8-a16d-2d8dc8fa8de6" providerId="AD" clId="Web-{58F8AD92-E8B7-4CCA-B37B-FEE9AABF84D3}" dt="2024-05-09T01:37:44.479" v="39"/>
-          <pc:sldLayoutMkLst>
-            <pc:docMk/>
-            <pc:sldMasterMk cId="3801673647" sldId="2147483763"/>
-            <pc:sldLayoutMk cId="495711449" sldId="2147483759"/>
-          </pc:sldLayoutMkLst>
-        </pc:sldLayoutChg>
-        <pc:sldLayoutChg chg="add">
-          <pc:chgData name="Ho, Chloe" userId="S::hochl@dickinson.edu::2f1fe282-63b7-44b8-a16d-2d8dc8fa8de6" providerId="AD" clId="Web-{58F8AD92-E8B7-4CCA-B37B-FEE9AABF84D3}" dt="2024-05-09T01:37:44.479" v="39"/>
-          <pc:sldLayoutMkLst>
-            <pc:docMk/>
-            <pc:sldMasterMk cId="3801673647" sldId="2147483763"/>
-            <pc:sldLayoutMk cId="2493795982" sldId="2147483760"/>
-          </pc:sldLayoutMkLst>
-        </pc:sldLayoutChg>
-        <pc:sldLayoutChg chg="add">
-          <pc:chgData name="Ho, Chloe" userId="S::hochl@dickinson.edu::2f1fe282-63b7-44b8-a16d-2d8dc8fa8de6" providerId="AD" clId="Web-{58F8AD92-E8B7-4CCA-B37B-FEE9AABF84D3}" dt="2024-05-09T01:37:44.479" v="39"/>
-          <pc:sldLayoutMkLst>
-            <pc:docMk/>
-            <pc:sldMasterMk cId="3801673647" sldId="2147483763"/>
-            <pc:sldLayoutMk cId="2489716192" sldId="2147483761"/>
-          </pc:sldLayoutMkLst>
-        </pc:sldLayoutChg>
-        <pc:sldLayoutChg chg="add">
-          <pc:chgData name="Ho, Chloe" userId="S::hochl@dickinson.edu::2f1fe282-63b7-44b8-a16d-2d8dc8fa8de6" providerId="AD" clId="Web-{58F8AD92-E8B7-4CCA-B37B-FEE9AABF84D3}" dt="2024-05-09T01:37:44.479" v="39"/>
-          <pc:sldLayoutMkLst>
-            <pc:docMk/>
-            <pc:sldMasterMk cId="3801673647" sldId="2147483763"/>
-            <pc:sldLayoutMk cId="2704842118" sldId="2147483762"/>
-          </pc:sldLayoutMkLst>
-        </pc:sldLayoutChg>
-      </pc:sldMasterChg>
-    </pc:docChg>
-  </pc:docChgLst>
-  <pc:docChgLst>
-    <pc:chgData name="Choudhri, Jacob" userId="2480717c-b00f-47b7-8e6a-a0eb82699da9" providerId="ADAL" clId="{AEBA13BE-6D84-45F5-9AE0-AEEC33F24144}"/>
-    <pc:docChg chg="undo redo custSel addSld delSld modSld">
-      <pc:chgData name="Choudhri, Jacob" userId="2480717c-b00f-47b7-8e6a-a0eb82699da9" providerId="ADAL" clId="{AEBA13BE-6D84-45F5-9AE0-AEEC33F24144}" dt="2024-05-10T23:00:08.823" v="535" actId="20577"/>
-      <pc:docMkLst>
-        <pc:docMk/>
-      </pc:docMkLst>
-      <pc:sldChg chg="modSp mod">
-        <pc:chgData name="Choudhri, Jacob" userId="2480717c-b00f-47b7-8e6a-a0eb82699da9" providerId="ADAL" clId="{AEBA13BE-6D84-45F5-9AE0-AEEC33F24144}" dt="2024-05-10T22:44:27.685" v="190" actId="1076"/>
-        <pc:sldMkLst>
-          <pc:docMk/>
-          <pc:sldMk cId="109857222" sldId="256"/>
-        </pc:sldMkLst>
-        <pc:picChg chg="mod">
-          <ac:chgData name="Choudhri, Jacob" userId="2480717c-b00f-47b7-8e6a-a0eb82699da9" providerId="ADAL" clId="{AEBA13BE-6D84-45F5-9AE0-AEEC33F24144}" dt="2024-05-10T22:44:27.685" v="190" actId="1076"/>
-          <ac:picMkLst>
-            <pc:docMk/>
-            <pc:sldMk cId="109857222" sldId="256"/>
-            <ac:picMk id="6" creationId="{C370DAED-4D9C-AB9E-7B76-CC7D191A9A67}"/>
-          </ac:picMkLst>
-        </pc:picChg>
-      </pc:sldChg>
-      <pc:sldChg chg="modSp">
-        <pc:chgData name="Choudhri, Jacob" userId="2480717c-b00f-47b7-8e6a-a0eb82699da9" providerId="ADAL" clId="{AEBA13BE-6D84-45F5-9AE0-AEEC33F24144}" dt="2024-05-10T22:31:53.546" v="69" actId="20577"/>
-        <pc:sldMkLst>
-          <pc:docMk/>
-          <pc:sldMk cId="627918015" sldId="258"/>
-        </pc:sldMkLst>
-        <pc:graphicFrameChg chg="mod">
-          <ac:chgData name="Choudhri, Jacob" userId="2480717c-b00f-47b7-8e6a-a0eb82699da9" providerId="ADAL" clId="{AEBA13BE-6D84-45F5-9AE0-AEEC33F24144}" dt="2024-05-10T22:31:53.546" v="69" actId="20577"/>
-          <ac:graphicFrameMkLst>
-            <pc:docMk/>
-            <pc:sldMk cId="627918015" sldId="258"/>
-            <ac:graphicFrameMk id="15" creationId="{D38C5F98-C8B5-D3C8-8547-C841D23E43CB}"/>
-          </ac:graphicFrameMkLst>
-        </pc:graphicFrameChg>
-      </pc:sldChg>
-      <pc:sldChg chg="modSp new del mod">
-        <pc:chgData name="Choudhri, Jacob" userId="2480717c-b00f-47b7-8e6a-a0eb82699da9" providerId="ADAL" clId="{AEBA13BE-6D84-45F5-9AE0-AEEC33F24144}" dt="2024-05-10T22:32:47.275" v="74" actId="47"/>
-        <pc:sldMkLst>
-          <pc:docMk/>
-          <pc:sldMk cId="2707493613" sldId="264"/>
-        </pc:sldMkLst>
-        <pc:spChg chg="mod">
-          <ac:chgData name="Choudhri, Jacob" userId="2480717c-b00f-47b7-8e6a-a0eb82699da9" providerId="ADAL" clId="{AEBA13BE-6D84-45F5-9AE0-AEEC33F24144}" dt="2024-05-10T22:32:28.516" v="71" actId="122"/>
-          <ac:spMkLst>
-            <pc:docMk/>
-            <pc:sldMk cId="2707493613" sldId="264"/>
-            <ac:spMk id="2" creationId="{9A16FA8B-F3E2-4104-9ED5-B9A9914EA204}"/>
-          </ac:spMkLst>
-        </pc:spChg>
-      </pc:sldChg>
-      <pc:sldChg chg="modSp new mod">
-        <pc:chgData name="Choudhri, Jacob" userId="2480717c-b00f-47b7-8e6a-a0eb82699da9" providerId="ADAL" clId="{AEBA13BE-6D84-45F5-9AE0-AEEC33F24144}" dt="2024-05-10T23:00:08.823" v="535" actId="20577"/>
-        <pc:sldMkLst>
-          <pc:docMk/>
-          <pc:sldMk cId="3532583803" sldId="265"/>
-        </pc:sldMkLst>
-        <pc:spChg chg="mod">
-          <ac:chgData name="Choudhri, Jacob" userId="2480717c-b00f-47b7-8e6a-a0eb82699da9" providerId="ADAL" clId="{AEBA13BE-6D84-45F5-9AE0-AEEC33F24144}" dt="2024-05-10T22:32:53.949" v="102" actId="20577"/>
-          <ac:spMkLst>
-            <pc:docMk/>
-            <pc:sldMk cId="3532583803" sldId="265"/>
-            <ac:spMk id="2" creationId="{7647F5F8-5499-174A-B2C7-20D71FB238C1}"/>
-          </ac:spMkLst>
-        </pc:spChg>
-        <pc:spChg chg="mod">
-          <ac:chgData name="Choudhri, Jacob" userId="2480717c-b00f-47b7-8e6a-a0eb82699da9" providerId="ADAL" clId="{AEBA13BE-6D84-45F5-9AE0-AEEC33F24144}" dt="2024-05-10T22:33:16.127" v="141" actId="20577"/>
-          <ac:spMkLst>
-            <pc:docMk/>
-            <pc:sldMk cId="3532583803" sldId="265"/>
-            <ac:spMk id="3" creationId="{FCD5C9B1-C2F7-8518-7A91-8FE76E1ADEEC}"/>
-          </ac:spMkLst>
-        </pc:spChg>
-        <pc:spChg chg="mod">
-          <ac:chgData name="Choudhri, Jacob" userId="2480717c-b00f-47b7-8e6a-a0eb82699da9" providerId="ADAL" clId="{AEBA13BE-6D84-45F5-9AE0-AEEC33F24144}" dt="2024-05-10T22:58:22.297" v="506" actId="27636"/>
-          <ac:spMkLst>
-            <pc:docMk/>
-            <pc:sldMk cId="3532583803" sldId="265"/>
-            <ac:spMk id="4" creationId="{03CB3421-4EA0-0E10-69C0-ED9EAD034082}"/>
-          </ac:spMkLst>
-        </pc:spChg>
-        <pc:spChg chg="mod">
-          <ac:chgData name="Choudhri, Jacob" userId="2480717c-b00f-47b7-8e6a-a0eb82699da9" providerId="ADAL" clId="{AEBA13BE-6D84-45F5-9AE0-AEEC33F24144}" dt="2024-05-10T22:33:34.284" v="175" actId="20577"/>
-          <ac:spMkLst>
-            <pc:docMk/>
-            <pc:sldMk cId="3532583803" sldId="265"/>
-            <ac:spMk id="5" creationId="{381925F2-C087-2E01-79B4-62516CC9504F}"/>
-          </ac:spMkLst>
-        </pc:spChg>
-        <pc:spChg chg="mod">
-          <ac:chgData name="Choudhri, Jacob" userId="2480717c-b00f-47b7-8e6a-a0eb82699da9" providerId="ADAL" clId="{AEBA13BE-6D84-45F5-9AE0-AEEC33F24144}" dt="2024-05-10T23:00:08.823" v="535" actId="20577"/>
-          <ac:spMkLst>
-            <pc:docMk/>
-            <pc:sldMk cId="3532583803" sldId="265"/>
-            <ac:spMk id="6" creationId="{4BAF1019-0BAB-B050-9600-84FFA108020A}"/>
-          </ac:spMkLst>
-        </pc:spChg>
-      </pc:sldChg>
-      <pc:sldChg chg="new del">
-        <pc:chgData name="Choudhri, Jacob" userId="2480717c-b00f-47b7-8e6a-a0eb82699da9" providerId="ADAL" clId="{AEBA13BE-6D84-45F5-9AE0-AEEC33F24144}" dt="2024-05-10T22:58:42.116" v="509" actId="47"/>
-        <pc:sldMkLst>
-          <pc:docMk/>
-          <pc:sldMk cId="674851437" sldId="266"/>
-        </pc:sldMkLst>
-      </pc:sldChg>
-      <pc:sldChg chg="modSp new mod">
-        <pc:chgData name="Choudhri, Jacob" userId="2480717c-b00f-47b7-8e6a-a0eb82699da9" providerId="ADAL" clId="{AEBA13BE-6D84-45F5-9AE0-AEEC33F24144}" dt="2024-05-10T22:58:53.079" v="524" actId="20577"/>
-        <pc:sldMkLst>
-          <pc:docMk/>
-          <pc:sldMk cId="1678077615" sldId="266"/>
-        </pc:sldMkLst>
-        <pc:spChg chg="mod">
-          <ac:chgData name="Choudhri, Jacob" userId="2480717c-b00f-47b7-8e6a-a0eb82699da9" providerId="ADAL" clId="{AEBA13BE-6D84-45F5-9AE0-AEEC33F24144}" dt="2024-05-10T22:58:53.079" v="524" actId="20577"/>
-          <ac:spMkLst>
-            <pc:docMk/>
-            <pc:sldMk cId="1678077615" sldId="266"/>
-            <ac:spMk id="2" creationId="{A1C44874-C124-4237-5EE2-3678DED8BED1}"/>
-          </ac:spMkLst>
-        </pc:spChg>
-      </pc:sldChg>
-    </pc:docChg>
-  </pc:docChgLst>
-  <pc:docChgLst>
-    <pc:chgData name="Choudhri, Jacob" userId="S::choudhrj@dickinson.edu::2480717c-b00f-47b7-8e6a-a0eb82699da9" providerId="AD" clId="Web-{1D4442B8-F6F2-7B6F-C715-85185AC0EF7D}"/>
-    <pc:docChg chg="modSld">
-      <pc:chgData name="Choudhri, Jacob" userId="S::choudhrj@dickinson.edu::2480717c-b00f-47b7-8e6a-a0eb82699da9" providerId="AD" clId="Web-{1D4442B8-F6F2-7B6F-C715-85185AC0EF7D}" dt="2024-05-10T22:24:20.744" v="54" actId="20577"/>
-      <pc:docMkLst>
-        <pc:docMk/>
-      </pc:docMkLst>
-      <pc:sldChg chg="modSp">
-        <pc:chgData name="Choudhri, Jacob" userId="S::choudhrj@dickinson.edu::2480717c-b00f-47b7-8e6a-a0eb82699da9" providerId="AD" clId="Web-{1D4442B8-F6F2-7B6F-C715-85185AC0EF7D}" dt="2024-05-10T22:24:20.744" v="54" actId="20577"/>
-        <pc:sldMkLst>
-          <pc:docMk/>
-          <pc:sldMk cId="627918015" sldId="258"/>
-        </pc:sldMkLst>
-        <pc:graphicFrameChg chg="modGraphic">
-          <ac:chgData name="Choudhri, Jacob" userId="S::choudhrj@dickinson.edu::2480717c-b00f-47b7-8e6a-a0eb82699da9" providerId="AD" clId="Web-{1D4442B8-F6F2-7B6F-C715-85185AC0EF7D}" dt="2024-05-10T22:24:20.744" v="54" actId="20577"/>
-          <ac:graphicFrameMkLst>
-            <pc:docMk/>
-            <pc:sldMk cId="627918015" sldId="258"/>
-            <ac:graphicFrameMk id="15" creationId="{D38C5F98-C8B5-D3C8-8547-C841D23E43CB}"/>
-          </ac:graphicFrameMkLst>
-        </pc:graphicFrameChg>
-      </pc:sldChg>
-      <pc:sldChg chg="modSp">
-        <pc:chgData name="Choudhri, Jacob" userId="S::choudhrj@dickinson.edu::2480717c-b00f-47b7-8e6a-a0eb82699da9" providerId="AD" clId="Web-{1D4442B8-F6F2-7B6F-C715-85185AC0EF7D}" dt="2024-05-10T22:21:41.864" v="4" actId="20577"/>
-        <pc:sldMkLst>
-          <pc:docMk/>
-          <pc:sldMk cId="3940602935" sldId="259"/>
-        </pc:sldMkLst>
-        <pc:spChg chg="mod">
-          <ac:chgData name="Choudhri, Jacob" userId="S::choudhrj@dickinson.edu::2480717c-b00f-47b7-8e6a-a0eb82699da9" providerId="AD" clId="Web-{1D4442B8-F6F2-7B6F-C715-85185AC0EF7D}" dt="2024-05-10T22:21:41.864" v="4" actId="20577"/>
-          <ac:spMkLst>
-            <pc:docMk/>
-            <pc:sldMk cId="3940602935" sldId="259"/>
-            <ac:spMk id="32" creationId="{40CDB9B7-1B00-FEC3-E79A-77B988ED7EF0}"/>
-          </ac:spMkLst>
-        </pc:spChg>
-      </pc:sldChg>
-    </pc:docChg>
-  </pc:docChgLst>
-</pc:chgInfo>
 </file>
 
 <file path=ppt/diagrams/colors1.xml><?xml version="1.0" encoding="utf-8"?>
@@ -5323,12 +3888,12 @@
     <dgm:cxn modelId="{212F4314-7494-481F-8101-56F1D7CB14DA}" type="presOf" srcId="{68FA99E9-47E9-4107-8FB4-5661E2E82A84}" destId="{D7A4D9DA-DDAE-4EAB-B324-2400C58C2CDF}" srcOrd="0" destOrd="1" presId="urn:microsoft.com/office/officeart/2018/2/layout/IconLabelDescriptionList"/>
     <dgm:cxn modelId="{7A2EC122-9D65-4B91-A2D2-056F06310DAA}" type="presOf" srcId="{84ACDBF9-0E81-4D4F-9F10-7BC96D1D0FBE}" destId="{979B50AA-ECC9-4547-A22F-F793B5872FFA}" srcOrd="0" destOrd="0" presId="urn:microsoft.com/office/officeart/2018/2/layout/IconLabelDescriptionList"/>
     <dgm:cxn modelId="{3E396334-9D51-46BC-994B-058B018C84D6}" srcId="{5EA693E1-AF81-4DFC-819C-006E04A7B438}" destId="{317A4593-7324-4175-A2CD-9634F7E62861}" srcOrd="1" destOrd="0" parTransId="{BD045999-DF84-4E6F-BCE3-E1FC8734F7DF}" sibTransId="{7ACCD15A-4E71-49C4-ABCD-CFD8B2CE7B02}"/>
+    <dgm:cxn modelId="{C4E2035E-FD48-4A0A-8D6B-AC8F95BE9422}" srcId="{317A4593-7324-4175-A2CD-9634F7E62861}" destId="{A9B81F6B-7556-4352-A148-D6F23B003AE3}" srcOrd="1" destOrd="0" parTransId="{64A2415C-BE82-4116-B71B-70F3B540A1AA}" sibTransId="{1BD00A48-49AD-45EC-B2CD-EE096A75BECF}"/>
+    <dgm:cxn modelId="{47BC6064-EFE2-48F2-9E86-43DF8DAE0D62}" type="presOf" srcId="{7967A787-BABD-464C-A35C-FE3B49463469}" destId="{15B57E04-2DA5-4DBD-8AF1-73184DF11805}" srcOrd="0" destOrd="0" presId="urn:microsoft.com/office/officeart/2018/2/layout/IconLabelDescriptionList"/>
     <dgm:cxn modelId="{5F28574D-23DD-46A6-9602-C53BA79C6E8F}" type="presOf" srcId="{5EA693E1-AF81-4DFC-819C-006E04A7B438}" destId="{7467F72F-5FFA-47E9-8471-93FAA65FCE9E}" srcOrd="0" destOrd="0" presId="urn:microsoft.com/office/officeart/2018/2/layout/IconLabelDescriptionList"/>
     <dgm:cxn modelId="{EB5E404E-14D5-4C1D-B8EB-10605A1CB6E1}" type="presOf" srcId="{64F4AAA5-E804-4E5F-9A22-F8F6801AB6C5}" destId="{D7A4D9DA-DDAE-4EAB-B324-2400C58C2CDF}" srcOrd="0" destOrd="0" presId="urn:microsoft.com/office/officeart/2018/2/layout/IconLabelDescriptionList"/>
+    <dgm:cxn modelId="{3291376F-D4D7-4388-8C44-8B51140B937B}" srcId="{84ACDBF9-0E81-4D4F-9F10-7BC96D1D0FBE}" destId="{64F4AAA5-E804-4E5F-9A22-F8F6801AB6C5}" srcOrd="0" destOrd="0" parTransId="{2715CB89-2D35-491C-974B-938B3EF435E9}" sibTransId="{A7F4BE91-F446-4FB7-9D2E-B5B47578BA41}"/>
     <dgm:cxn modelId="{3DE2F44F-3B73-42DF-A399-DE84AA58BC37}" srcId="{84ACDBF9-0E81-4D4F-9F10-7BC96D1D0FBE}" destId="{68FA99E9-47E9-4107-8FB4-5661E2E82A84}" srcOrd="1" destOrd="0" parTransId="{2CC0E4A0-EB24-4831-B7FB-9734DEA29B12}" sibTransId="{6781EF91-D83C-4A52-B0BC-12593F2B7664}"/>
-    <dgm:cxn modelId="{C4E2035E-FD48-4A0A-8D6B-AC8F95BE9422}" srcId="{317A4593-7324-4175-A2CD-9634F7E62861}" destId="{A9B81F6B-7556-4352-A148-D6F23B003AE3}" srcOrd="1" destOrd="0" parTransId="{64A2415C-BE82-4116-B71B-70F3B540A1AA}" sibTransId="{1BD00A48-49AD-45EC-B2CD-EE096A75BECF}"/>
-    <dgm:cxn modelId="{47BC6064-EFE2-48F2-9E86-43DF8DAE0D62}" type="presOf" srcId="{7967A787-BABD-464C-A35C-FE3B49463469}" destId="{15B57E04-2DA5-4DBD-8AF1-73184DF11805}" srcOrd="0" destOrd="0" presId="urn:microsoft.com/office/officeart/2018/2/layout/IconLabelDescriptionList"/>
-    <dgm:cxn modelId="{3291376F-D4D7-4388-8C44-8B51140B937B}" srcId="{84ACDBF9-0E81-4D4F-9F10-7BC96D1D0FBE}" destId="{64F4AAA5-E804-4E5F-9A22-F8F6801AB6C5}" srcOrd="0" destOrd="0" parTransId="{2715CB89-2D35-491C-974B-938B3EF435E9}" sibTransId="{A7F4BE91-F446-4FB7-9D2E-B5B47578BA41}"/>
     <dgm:cxn modelId="{19407072-85D0-4454-B21E-545E59B714DD}" type="presOf" srcId="{A9B81F6B-7556-4352-A148-D6F23B003AE3}" destId="{15B57E04-2DA5-4DBD-8AF1-73184DF11805}" srcOrd="0" destOrd="1" presId="urn:microsoft.com/office/officeart/2018/2/layout/IconLabelDescriptionList"/>
     <dgm:cxn modelId="{2803347D-D1E4-4C06-8077-1A07D94090F3}" type="presOf" srcId="{317A4593-7324-4175-A2CD-9634F7E62861}" destId="{A6562878-A5F0-44A2-9AB8-341CF52A1DF2}" srcOrd="0" destOrd="0" presId="urn:microsoft.com/office/officeart/2018/2/layout/IconLabelDescriptionList"/>
     <dgm:cxn modelId="{2A4A1E8E-7586-4954-9BCF-759B81458AD5}" srcId="{317A4593-7324-4175-A2CD-9634F7E62861}" destId="{7967A787-BABD-464C-A35C-FE3B49463469}" srcOrd="0" destOrd="0" parTransId="{B6F4903E-B5BC-49CF-870C-47C1A095F58D}" sibTransId="{A5AB8FAD-05F1-4199-A75C-1F8AD284D3D9}"/>
@@ -11767,7 +10332,7 @@
           <a:p>
             <a:fld id="{79C5A860-F335-4252-AA00-24FB67ED2982}" type="datetime1">
               <a:rPr lang="en-US" smtClean="0"/>
-              <a:t>5/13/24</a:t>
+              <a:t>5/14/2024</a:t>
             </a:fld>
             <a:endParaRPr lang="en-US"/>
           </a:p>
@@ -11965,7 +10530,7 @@
           <a:p>
             <a:fld id="{46AB1048-0047-48CA-88BA-D69B470942CF}" type="datetime1">
               <a:rPr lang="en-US" smtClean="0"/>
-              <a:t>5/13/24</a:t>
+              <a:t>5/14/2024</a:t>
             </a:fld>
             <a:endParaRPr lang="en-US"/>
           </a:p>
@@ -12173,7 +10738,7 @@
           <a:p>
             <a:fld id="{5BD83879-648C-49A9-81A2-0EF5946532D0}" type="datetime1">
               <a:rPr lang="en-US" smtClean="0"/>
-              <a:t>5/13/24</a:t>
+              <a:t>5/14/2024</a:t>
             </a:fld>
             <a:endParaRPr lang="en-US"/>
           </a:p>
@@ -12371,7 +10936,7 @@
           <a:p>
             <a:fld id="{D04BC802-30E3-4658-9CCA-F873646FEC67}" type="datetime1">
               <a:rPr lang="en-US" smtClean="0"/>
-              <a:t>5/13/24</a:t>
+              <a:t>5/14/2024</a:t>
             </a:fld>
             <a:endParaRPr lang="en-US"/>
           </a:p>
@@ -12648,7 +11213,7 @@
           <a:p>
             <a:fld id="{0AB227A3-19CE-4153-81CE-64EB7AB094B3}" type="datetime1">
               <a:rPr lang="en-US" smtClean="0"/>
-              <a:t>5/13/24</a:t>
+              <a:t>5/14/2024</a:t>
             </a:fld>
             <a:endParaRPr lang="en-US"/>
           </a:p>
@@ -12913,7 +11478,7 @@
           <a:p>
             <a:fld id="{B819A100-10F6-477E-8847-29D479EF1C92}" type="datetime1">
               <a:rPr lang="en-US" smtClean="0"/>
-              <a:t>5/13/24</a:t>
+              <a:t>5/14/2024</a:t>
             </a:fld>
             <a:endParaRPr lang="en-US"/>
           </a:p>
@@ -13325,7 +11890,7 @@
           <a:p>
             <a:fld id="{5DF128AB-198A-495F-8475-FDB360C9873F}" type="datetime1">
               <a:rPr lang="en-US" smtClean="0"/>
-              <a:t>5/13/24</a:t>
+              <a:t>5/14/2024</a:t>
             </a:fld>
             <a:endParaRPr lang="en-US"/>
           </a:p>
@@ -13466,7 +12031,7 @@
           <a:p>
             <a:fld id="{021A235E-F8FD-479F-9FC7-18BE84110877}" type="datetime1">
               <a:rPr lang="en-US" smtClean="0"/>
-              <a:t>5/13/24</a:t>
+              <a:t>5/14/2024</a:t>
             </a:fld>
             <a:endParaRPr lang="en-US"/>
           </a:p>
@@ -13579,7 +12144,7 @@
           <a:p>
             <a:fld id="{E890F09B-68DA-462E-9DB4-4C9ADAB8CBCC}" type="datetime1">
               <a:rPr lang="en-US" smtClean="0"/>
-              <a:t>5/13/24</a:t>
+              <a:t>5/14/2024</a:t>
             </a:fld>
             <a:endParaRPr lang="en-US"/>
           </a:p>
@@ -13896,7 +12461,7 @@
           <a:p>
             <a:fld id="{17AC4E36-FABE-47EB-AA7F-C19A93824617}" type="datetime1">
               <a:rPr lang="en-US" smtClean="0"/>
-              <a:t>5/13/24</a:t>
+              <a:t>5/14/2024</a:t>
             </a:fld>
             <a:endParaRPr lang="en-US"/>
           </a:p>
@@ -14191,7 +12756,7 @@
           <a:p>
             <a:fld id="{F199CE6B-5DE6-4A2D-B72E-5E8969F9F56F}" type="datetime1">
               <a:rPr lang="en-US" smtClean="0"/>
-              <a:t>5/13/24</a:t>
+              <a:t>5/14/2024</a:t>
             </a:fld>
             <a:endParaRPr lang="en-US"/>
           </a:p>
@@ -15047,7 +13612,7 @@
           <a:p>
             <a:fld id="{F481A142-DA77-4A5F-AD1F-14E6C18F0F5F}" type="datetime1">
               <a:rPr lang="en-US" smtClean="0"/>
-              <a:t>5/13/24</a:t>
+              <a:t>5/14/2024</a:t>
             </a:fld>
             <a:endParaRPr lang="en-US"/>
           </a:p>
@@ -16084,6 +14649,446 @@
 <file path=ppt/slides/slide10.xml><?xml version="1.0" encoding="utf-8"?>
 <p:sld xmlns:a="http://schemas.openxmlformats.org/drawingml/2006/main" xmlns:r="http://schemas.openxmlformats.org/officeDocument/2006/relationships" xmlns:p="http://schemas.openxmlformats.org/presentationml/2006/main">
   <p:cSld>
+    <p:spTree>
+      <p:nvGrpSpPr>
+        <p:cNvPr id="1" name=""/>
+        <p:cNvGrpSpPr/>
+        <p:nvPr/>
+      </p:nvGrpSpPr>
+      <p:grpSpPr>
+        <a:xfrm>
+          <a:off x="0" y="0"/>
+          <a:ext cx="0" cy="0"/>
+          <a:chOff x="0" y="0"/>
+          <a:chExt cx="0" cy="0"/>
+        </a:xfrm>
+      </p:grpSpPr>
+      <p:pic>
+        <p:nvPicPr>
+          <p:cNvPr id="9" name="Content Placeholder 6" descr="A graph with different colored bars&#10;&#10;Description automatically generated">
+            <a:extLst>
+              <a:ext uri="{FF2B5EF4-FFF2-40B4-BE49-F238E27FC236}">
+                <a16:creationId xmlns:a16="http://schemas.microsoft.com/office/drawing/2014/main" id="{D7D3CEDC-08F8-CBEF-9B55-4377A7F925E9}"/>
+              </a:ext>
+            </a:extLst>
+          </p:cNvPr>
+          <p:cNvPicPr>
+            <a:picLocks noChangeAspect="1"/>
+          </p:cNvPicPr>
+          <p:nvPr/>
+        </p:nvPicPr>
+        <p:blipFill>
+          <a:blip r:embed="rId2"/>
+          <a:stretch>
+            <a:fillRect/>
+          </a:stretch>
+        </p:blipFill>
+        <p:spPr>
+          <a:xfrm>
+            <a:off x="429551" y="688670"/>
+            <a:ext cx="8119530" cy="5473226"/>
+          </a:xfrm>
+          <a:prstGeom prst="rect">
+            <a:avLst/>
+          </a:prstGeom>
+        </p:spPr>
+      </p:pic>
+      <p:sp>
+        <p:nvSpPr>
+          <p:cNvPr id="4" name="Content Placeholder 3">
+            <a:extLst>
+              <a:ext uri="{FF2B5EF4-FFF2-40B4-BE49-F238E27FC236}">
+                <a16:creationId xmlns:a16="http://schemas.microsoft.com/office/drawing/2014/main" id="{4B15FA22-8E28-4725-CA61-F124A16F23BC}"/>
+              </a:ext>
+            </a:extLst>
+          </p:cNvPr>
+          <p:cNvSpPr>
+            <a:spLocks noGrp="1"/>
+          </p:cNvSpPr>
+          <p:nvPr>
+            <p:ph idx="1"/>
+          </p:nvPr>
+        </p:nvSpPr>
+        <p:spPr>
+          <a:xfrm>
+            <a:off x="7493430" y="2106204"/>
+            <a:ext cx="4515173" cy="1143518"/>
+          </a:xfrm>
+        </p:spPr>
+        <p:txBody>
+          <a:bodyPr vert="horz" lIns="91440" tIns="45720" rIns="91440" bIns="45720" rtlCol="0" anchor="t">
+            <a:normAutofit/>
+          </a:bodyPr>
+          <a:lstStyle/>
+          <a:p>
+            <a:endParaRPr lang="en-US"/>
+          </a:p>
+          <a:p>
+            <a:endParaRPr lang="en-US">
+              <a:ea typeface="+mn-lt"/>
+              <a:cs typeface="+mn-lt"/>
+            </a:endParaRPr>
+          </a:p>
+        </p:txBody>
+      </p:sp>
+      <p:sp>
+        <p:nvSpPr>
+          <p:cNvPr id="5" name="Title 4">
+            <a:extLst>
+              <a:ext uri="{FF2B5EF4-FFF2-40B4-BE49-F238E27FC236}">
+                <a16:creationId xmlns:a16="http://schemas.microsoft.com/office/drawing/2014/main" id="{53F5A9B8-4C90-07D4-E1E4-620A1E5AF47D}"/>
+              </a:ext>
+            </a:extLst>
+          </p:cNvPr>
+          <p:cNvSpPr>
+            <a:spLocks noGrp="1"/>
+          </p:cNvSpPr>
+          <p:nvPr>
+            <p:ph type="title"/>
+          </p:nvPr>
+        </p:nvSpPr>
+        <p:spPr/>
+        <p:txBody>
+          <a:bodyPr/>
+          <a:lstStyle/>
+          <a:p>
+            <a:endParaRPr lang="en-US"/>
+          </a:p>
+        </p:txBody>
+      </p:sp>
+      <p:pic>
+        <p:nvPicPr>
+          <p:cNvPr id="6" name="Picture 5" descr="A screenshot of a computer&#10;&#10;Description automatically generated">
+            <a:extLst>
+              <a:ext uri="{FF2B5EF4-FFF2-40B4-BE49-F238E27FC236}">
+                <a16:creationId xmlns:a16="http://schemas.microsoft.com/office/drawing/2014/main" id="{12FFB037-B46A-842B-B235-3A27E684D9F0}"/>
+              </a:ext>
+            </a:extLst>
+          </p:cNvPr>
+          <p:cNvPicPr>
+            <a:picLocks noChangeAspect="1"/>
+          </p:cNvPicPr>
+          <p:nvPr/>
+        </p:nvPicPr>
+        <p:blipFill rotWithShape="1">
+          <a:blip r:embed="rId3"/>
+          <a:srcRect t="291" r="35940" b="24"/>
+          <a:stretch/>
+        </p:blipFill>
+        <p:spPr>
+          <a:xfrm>
+            <a:off x="8729141" y="691003"/>
+            <a:ext cx="2651692" cy="5467574"/>
+          </a:xfrm>
+          <a:prstGeom prst="rect">
+            <a:avLst/>
+          </a:prstGeom>
+        </p:spPr>
+      </p:pic>
+      <p:pic>
+        <p:nvPicPr>
+          <p:cNvPr id="7" name="Picture 6" descr="A screenshot of a computer&#10;&#10;Description automatically generated">
+            <a:extLst>
+              <a:ext uri="{FF2B5EF4-FFF2-40B4-BE49-F238E27FC236}">
+                <a16:creationId xmlns:a16="http://schemas.microsoft.com/office/drawing/2014/main" id="{D3D47950-C688-87B9-606A-90411D3A0DE6}"/>
+              </a:ext>
+            </a:extLst>
+          </p:cNvPr>
+          <p:cNvPicPr>
+            <a:picLocks noChangeAspect="1"/>
+          </p:cNvPicPr>
+          <p:nvPr/>
+        </p:nvPicPr>
+        <p:blipFill>
+          <a:blip r:embed="rId4"/>
+          <a:stretch>
+            <a:fillRect/>
+          </a:stretch>
+        </p:blipFill>
+        <p:spPr>
+          <a:xfrm>
+            <a:off x="8729662" y="4095750"/>
+            <a:ext cx="2691341" cy="2060863"/>
+          </a:xfrm>
+          <a:prstGeom prst="rect">
+            <a:avLst/>
+          </a:prstGeom>
+        </p:spPr>
+      </p:pic>
+    </p:spTree>
+    <p:extLst>
+      <p:ext uri="{BB962C8B-B14F-4D97-AF65-F5344CB8AC3E}">
+        <p14:creationId xmlns:p14="http://schemas.microsoft.com/office/powerpoint/2010/main" val="3685718716"/>
+      </p:ext>
+    </p:extLst>
+  </p:cSld>
+  <p:clrMapOvr>
+    <a:masterClrMapping/>
+  </p:clrMapOvr>
+</p:sld>
+</file>
+
+<file path=ppt/slides/slide11.xml><?xml version="1.0" encoding="utf-8"?>
+<p:sld xmlns:a="http://schemas.openxmlformats.org/drawingml/2006/main" xmlns:r="http://schemas.openxmlformats.org/officeDocument/2006/relationships" xmlns:p="http://schemas.openxmlformats.org/presentationml/2006/main">
+  <p:cSld>
+    <p:spTree>
+      <p:nvGrpSpPr>
+        <p:cNvPr id="1" name=""/>
+        <p:cNvGrpSpPr/>
+        <p:nvPr/>
+      </p:nvGrpSpPr>
+      <p:grpSpPr>
+        <a:xfrm>
+          <a:off x="0" y="0"/>
+          <a:ext cx="0" cy="0"/>
+          <a:chOff x="0" y="0"/>
+          <a:chExt cx="0" cy="0"/>
+        </a:xfrm>
+      </p:grpSpPr>
+      <p:pic>
+        <p:nvPicPr>
+          <p:cNvPr id="6" name="Content Placeholder 5" descr="A screenshot of a computer&#10;&#10;Description automatically generated">
+            <a:extLst>
+              <a:ext uri="{FF2B5EF4-FFF2-40B4-BE49-F238E27FC236}">
+                <a16:creationId xmlns:a16="http://schemas.microsoft.com/office/drawing/2014/main" id="{26ED52D6-D91F-34B9-E065-ECCE626BDA4E}"/>
+              </a:ext>
+            </a:extLst>
+          </p:cNvPr>
+          <p:cNvPicPr>
+            <a:picLocks noGrp="1" noChangeAspect="1"/>
+          </p:cNvPicPr>
+          <p:nvPr>
+            <p:ph idx="1"/>
+          </p:nvPr>
+        </p:nvPicPr>
+        <p:blipFill rotWithShape="1">
+          <a:blip r:embed="rId2"/>
+          <a:srcRect t="707" r="-99"/>
+          <a:stretch/>
+        </p:blipFill>
+        <p:spPr>
+          <a:xfrm>
+            <a:off x="3432050" y="265393"/>
+            <a:ext cx="7530347" cy="6316842"/>
+          </a:xfrm>
+        </p:spPr>
+      </p:pic>
+      <p:sp>
+        <p:nvSpPr>
+          <p:cNvPr id="4" name="TextBox 3">
+            <a:extLst>
+              <a:ext uri="{FF2B5EF4-FFF2-40B4-BE49-F238E27FC236}">
+                <a16:creationId xmlns:a16="http://schemas.microsoft.com/office/drawing/2014/main" id="{5D8C77CD-38DA-1788-1FAE-E48F9E8D722A}"/>
+              </a:ext>
+            </a:extLst>
+          </p:cNvPr>
+          <p:cNvSpPr txBox="1"/>
+          <p:nvPr/>
+        </p:nvSpPr>
+        <p:spPr>
+          <a:xfrm>
+            <a:off x="266458" y="2327289"/>
+            <a:ext cx="2521605" cy="1908215"/>
+          </a:xfrm>
+          <a:prstGeom prst="rect">
+            <a:avLst/>
+          </a:prstGeom>
+          <a:noFill/>
+        </p:spPr>
+        <p:txBody>
+          <a:bodyPr rot="0" spcFirstLastPara="0" vertOverflow="overflow" horzOverflow="overflow" vert="horz" wrap="square" lIns="91440" tIns="45720" rIns="91440" bIns="45720" numCol="1" spcCol="0" rtlCol="0" fromWordArt="0" anchor="t" anchorCtr="0" forceAA="0" compatLnSpc="1">
+            <a:prstTxWarp prst="textNoShape">
+              <a:avLst/>
+            </a:prstTxWarp>
+            <a:spAutoFit/>
+          </a:bodyPr>
+          <a:lstStyle/>
+          <a:p>
+            <a:r>
+              <a:rPr lang="en-US"/>
+              <a:t>b) </a:t>
+            </a:r>
+            <a:r>
+              <a:rPr lang="en-US" sz="2000">
+                <a:ea typeface="+mn-lt"/>
+                <a:cs typeface="+mn-lt"/>
+              </a:rPr>
+              <a:t>Understanding the relationship between university raking and job prospects</a:t>
+            </a:r>
+            <a:endParaRPr lang="en-US" sz="2000">
+              <a:solidFill>
+                <a:srgbClr val="000000"/>
+              </a:solidFill>
+              <a:ea typeface="+mn-lt"/>
+              <a:cs typeface="+mn-lt"/>
+            </a:endParaRPr>
+          </a:p>
+          <a:p>
+            <a:endParaRPr lang="en-US"/>
+          </a:p>
+        </p:txBody>
+      </p:sp>
+    </p:spTree>
+    <p:extLst>
+      <p:ext uri="{BB962C8B-B14F-4D97-AF65-F5344CB8AC3E}">
+        <p14:creationId xmlns:p14="http://schemas.microsoft.com/office/powerpoint/2010/main" val="1587400543"/>
+      </p:ext>
+    </p:extLst>
+  </p:cSld>
+  <p:clrMapOvr>
+    <a:masterClrMapping/>
+  </p:clrMapOvr>
+</p:sld>
+</file>
+
+<file path=ppt/slides/slide12.xml><?xml version="1.0" encoding="utf-8"?>
+<p:sld xmlns:a="http://schemas.openxmlformats.org/drawingml/2006/main" xmlns:r="http://schemas.openxmlformats.org/officeDocument/2006/relationships" xmlns:p="http://schemas.openxmlformats.org/presentationml/2006/main">
+  <p:cSld>
+    <p:spTree>
+      <p:nvGrpSpPr>
+        <p:cNvPr id="1" name=""/>
+        <p:cNvGrpSpPr/>
+        <p:nvPr/>
+      </p:nvGrpSpPr>
+      <p:grpSpPr>
+        <a:xfrm>
+          <a:off x="0" y="0"/>
+          <a:ext cx="0" cy="0"/>
+          <a:chOff x="0" y="0"/>
+          <a:chExt cx="0" cy="0"/>
+        </a:xfrm>
+      </p:grpSpPr>
+      <p:sp>
+        <p:nvSpPr>
+          <p:cNvPr id="4" name="TextBox 3">
+            <a:extLst>
+              <a:ext uri="{FF2B5EF4-FFF2-40B4-BE49-F238E27FC236}">
+                <a16:creationId xmlns:a16="http://schemas.microsoft.com/office/drawing/2014/main" id="{5D8C77CD-38DA-1788-1FAE-E48F9E8D722A}"/>
+              </a:ext>
+            </a:extLst>
+          </p:cNvPr>
+          <p:cNvSpPr txBox="1"/>
+          <p:nvPr/>
+        </p:nvSpPr>
+        <p:spPr>
+          <a:xfrm>
+            <a:off x="682094" y="1711531"/>
+            <a:ext cx="2521605" cy="1908215"/>
+          </a:xfrm>
+          <a:prstGeom prst="rect">
+            <a:avLst/>
+          </a:prstGeom>
+          <a:noFill/>
+        </p:spPr>
+        <p:txBody>
+          <a:bodyPr rot="0" spcFirstLastPara="0" vertOverflow="overflow" horzOverflow="overflow" vert="horz" wrap="square" lIns="91440" tIns="45720" rIns="91440" bIns="45720" numCol="1" spcCol="0" rtlCol="0" fromWordArt="0" anchor="t" anchorCtr="0" forceAA="0" compatLnSpc="1">
+            <a:prstTxWarp prst="textNoShape">
+              <a:avLst/>
+            </a:prstTxWarp>
+            <a:spAutoFit/>
+          </a:bodyPr>
+          <a:lstStyle/>
+          <a:p>
+            <a:r>
+              <a:rPr lang="en-US"/>
+              <a:t>b) </a:t>
+            </a:r>
+            <a:r>
+              <a:rPr lang="en-US" sz="2000">
+                <a:ea typeface="+mn-lt"/>
+                <a:cs typeface="+mn-lt"/>
+              </a:rPr>
+              <a:t>Understanding the relationship between university raking and job prospects</a:t>
+            </a:r>
+            <a:endParaRPr lang="en-US" sz="2000">
+              <a:solidFill>
+                <a:srgbClr val="000000"/>
+              </a:solidFill>
+              <a:ea typeface="+mn-lt"/>
+              <a:cs typeface="+mn-lt"/>
+            </a:endParaRPr>
+          </a:p>
+          <a:p>
+            <a:endParaRPr lang="en-US"/>
+          </a:p>
+        </p:txBody>
+      </p:sp>
+      <p:pic>
+        <p:nvPicPr>
+          <p:cNvPr id="7" name="Picture 6" descr="A graph of a curve&#10;&#10;Description automatically generated">
+            <a:extLst>
+              <a:ext uri="{FF2B5EF4-FFF2-40B4-BE49-F238E27FC236}">
+                <a16:creationId xmlns:a16="http://schemas.microsoft.com/office/drawing/2014/main" id="{BF11AC41-148F-49D5-144C-68AC25F6533A}"/>
+              </a:ext>
+            </a:extLst>
+          </p:cNvPr>
+          <p:cNvPicPr>
+            <a:picLocks noChangeAspect="1"/>
+          </p:cNvPicPr>
+          <p:nvPr/>
+        </p:nvPicPr>
+        <p:blipFill>
+          <a:blip r:embed="rId2"/>
+          <a:stretch>
+            <a:fillRect/>
+          </a:stretch>
+        </p:blipFill>
+        <p:spPr>
+          <a:xfrm>
+            <a:off x="4479491" y="967509"/>
+            <a:ext cx="7204654" cy="5315527"/>
+          </a:xfrm>
+          <a:prstGeom prst="rect">
+            <a:avLst/>
+          </a:prstGeom>
+        </p:spPr>
+      </p:pic>
+      <p:pic>
+        <p:nvPicPr>
+          <p:cNvPr id="8" name="Picture 7" descr="A screenshot of a graph&#10;&#10;Description automatically generated">
+            <a:extLst>
+              <a:ext uri="{FF2B5EF4-FFF2-40B4-BE49-F238E27FC236}">
+                <a16:creationId xmlns:a16="http://schemas.microsoft.com/office/drawing/2014/main" id="{30A7C434-49E9-1C65-EBFF-544D59E8B2BF}"/>
+              </a:ext>
+            </a:extLst>
+          </p:cNvPr>
+          <p:cNvPicPr>
+            <a:picLocks noChangeAspect="1"/>
+          </p:cNvPicPr>
+          <p:nvPr/>
+        </p:nvPicPr>
+        <p:blipFill>
+          <a:blip r:embed="rId3"/>
+          <a:stretch>
+            <a:fillRect/>
+          </a:stretch>
+        </p:blipFill>
+        <p:spPr>
+          <a:xfrm>
+            <a:off x="339244" y="4385540"/>
+            <a:ext cx="3801148" cy="1896918"/>
+          </a:xfrm>
+          <a:prstGeom prst="rect">
+            <a:avLst/>
+          </a:prstGeom>
+        </p:spPr>
+      </p:pic>
+    </p:spTree>
+    <p:extLst>
+      <p:ext uri="{BB962C8B-B14F-4D97-AF65-F5344CB8AC3E}">
+        <p14:creationId xmlns:p14="http://schemas.microsoft.com/office/powerpoint/2010/main" val="3756324398"/>
+      </p:ext>
+    </p:extLst>
+  </p:cSld>
+  <p:clrMapOvr>
+    <a:masterClrMapping/>
+  </p:clrMapOvr>
+</p:sld>
+</file>
+
+<file path=ppt/slides/slide13.xml><?xml version="1.0" encoding="utf-8"?>
+<p:sld xmlns:a="http://schemas.openxmlformats.org/drawingml/2006/main" xmlns:r="http://schemas.openxmlformats.org/officeDocument/2006/relationships" xmlns:p="http://schemas.openxmlformats.org/presentationml/2006/main">
+  <p:cSld>
     <p:bg>
       <p:bgPr>
         <a:solidFill>
@@ -16310,7 +15315,7 @@
 </p:sld>
 </file>
 
-<file path=ppt/slides/slide11.xml><?xml version="1.0" encoding="utf-8"?>
+<file path=ppt/slides/slide14.xml><?xml version="1.0" encoding="utf-8"?>
 <p:sld xmlns:a="http://schemas.openxmlformats.org/drawingml/2006/main" xmlns:r="http://schemas.openxmlformats.org/officeDocument/2006/relationships" xmlns:p="http://schemas.openxmlformats.org/presentationml/2006/main">
   <p:cSld>
     <p:spTree>
@@ -16975,6 +15980,200 @@
 </file>
 
 <file path=ppt/slides/slide4.xml><?xml version="1.0" encoding="utf-8"?>
+<p:sld xmlns:a="http://schemas.openxmlformats.org/drawingml/2006/main" xmlns:r="http://schemas.openxmlformats.org/officeDocument/2006/relationships" xmlns:p="http://schemas.openxmlformats.org/presentationml/2006/main">
+  <p:cSld>
+    <p:spTree>
+      <p:nvGrpSpPr>
+        <p:cNvPr id="1" name=""/>
+        <p:cNvGrpSpPr/>
+        <p:nvPr/>
+      </p:nvGrpSpPr>
+      <p:grpSpPr>
+        <a:xfrm>
+          <a:off x="0" y="0"/>
+          <a:ext cx="0" cy="0"/>
+          <a:chOff x="0" y="0"/>
+          <a:chExt cx="0" cy="0"/>
+        </a:xfrm>
+      </p:grpSpPr>
+      <p:sp>
+        <p:nvSpPr>
+          <p:cNvPr id="2" name="Title 1">
+            <a:extLst>
+              <a:ext uri="{FF2B5EF4-FFF2-40B4-BE49-F238E27FC236}">
+                <a16:creationId xmlns:a16="http://schemas.microsoft.com/office/drawing/2014/main" id="{B2EC7D87-4799-08F5-F284-A7F592BF5449}"/>
+              </a:ext>
+            </a:extLst>
+          </p:cNvPr>
+          <p:cNvSpPr>
+            <a:spLocks noGrp="1"/>
+          </p:cNvSpPr>
+          <p:nvPr>
+            <p:ph type="title"/>
+          </p:nvPr>
+        </p:nvSpPr>
+        <p:spPr>
+          <a:xfrm>
+            <a:off x="609600" y="319178"/>
+            <a:ext cx="10972800" cy="755988"/>
+          </a:xfrm>
+        </p:spPr>
+        <p:txBody>
+          <a:bodyPr>
+            <a:normAutofit fontScale="90000"/>
+          </a:bodyPr>
+          <a:lstStyle/>
+          <a:p>
+            <a:r>
+              <a:rPr lang="en-US">
+                <a:cs typeface="Posterama"/>
+              </a:rPr>
+              <a:t>Job Posting Dataset</a:t>
+            </a:r>
+            <a:endParaRPr lang="en-US"/>
+          </a:p>
+        </p:txBody>
+      </p:sp>
+      <p:pic>
+        <p:nvPicPr>
+          <p:cNvPr id="10" name="Content Placeholder 9">
+            <a:extLst>
+              <a:ext uri="{FF2B5EF4-FFF2-40B4-BE49-F238E27FC236}">
+                <a16:creationId xmlns:a16="http://schemas.microsoft.com/office/drawing/2014/main" id="{2F221F22-F133-5D74-DA6A-B3155C854B20}"/>
+              </a:ext>
+            </a:extLst>
+          </p:cNvPr>
+          <p:cNvPicPr>
+            <a:picLocks noGrp="1" noChangeAspect="1"/>
+          </p:cNvPicPr>
+          <p:nvPr>
+            <p:ph idx="1"/>
+          </p:nvPr>
+        </p:nvPicPr>
+        <p:blipFill>
+          <a:blip r:embed="rId2"/>
+          <a:stretch>
+            <a:fillRect/>
+          </a:stretch>
+        </p:blipFill>
+        <p:spPr>
+          <a:xfrm>
+            <a:off x="53879" y="1358018"/>
+            <a:ext cx="12076544" cy="4947935"/>
+          </a:xfrm>
+        </p:spPr>
+      </p:pic>
+    </p:spTree>
+    <p:extLst>
+      <p:ext uri="{BB962C8B-B14F-4D97-AF65-F5344CB8AC3E}">
+        <p14:creationId xmlns:p14="http://schemas.microsoft.com/office/powerpoint/2010/main" val="2550709185"/>
+      </p:ext>
+    </p:extLst>
+  </p:cSld>
+  <p:clrMapOvr>
+    <a:masterClrMapping/>
+  </p:clrMapOvr>
+</p:sld>
+</file>
+
+<file path=ppt/slides/slide5.xml><?xml version="1.0" encoding="utf-8"?>
+<p:sld xmlns:a="http://schemas.openxmlformats.org/drawingml/2006/main" xmlns:r="http://schemas.openxmlformats.org/officeDocument/2006/relationships" xmlns:p="http://schemas.openxmlformats.org/presentationml/2006/main">
+  <p:cSld>
+    <p:spTree>
+      <p:nvGrpSpPr>
+        <p:cNvPr id="1" name=""/>
+        <p:cNvGrpSpPr/>
+        <p:nvPr/>
+      </p:nvGrpSpPr>
+      <p:grpSpPr>
+        <a:xfrm>
+          <a:off x="0" y="0"/>
+          <a:ext cx="0" cy="0"/>
+          <a:chOff x="0" y="0"/>
+          <a:chExt cx="0" cy="0"/>
+        </a:xfrm>
+      </p:grpSpPr>
+      <p:sp>
+        <p:nvSpPr>
+          <p:cNvPr id="2" name="Title 1">
+            <a:extLst>
+              <a:ext uri="{FF2B5EF4-FFF2-40B4-BE49-F238E27FC236}">
+                <a16:creationId xmlns:a16="http://schemas.microsoft.com/office/drawing/2014/main" id="{B2EC7D87-4799-08F5-F284-A7F592BF5449}"/>
+              </a:ext>
+            </a:extLst>
+          </p:cNvPr>
+          <p:cNvSpPr>
+            <a:spLocks noGrp="1"/>
+          </p:cNvSpPr>
+          <p:nvPr>
+            <p:ph type="title"/>
+          </p:nvPr>
+        </p:nvSpPr>
+        <p:spPr>
+          <a:xfrm>
+            <a:off x="609600" y="319178"/>
+            <a:ext cx="10972800" cy="755988"/>
+          </a:xfrm>
+        </p:spPr>
+        <p:txBody>
+          <a:bodyPr>
+            <a:normAutofit fontScale="90000"/>
+          </a:bodyPr>
+          <a:lstStyle/>
+          <a:p>
+            <a:r>
+              <a:rPr lang="en-US">
+                <a:cs typeface="Posterama"/>
+              </a:rPr>
+              <a:t>Profile Dataset</a:t>
+            </a:r>
+            <a:endParaRPr lang="en-US"/>
+          </a:p>
+        </p:txBody>
+      </p:sp>
+      <p:pic>
+        <p:nvPicPr>
+          <p:cNvPr id="5" name="Content Placeholder 4">
+            <a:extLst>
+              <a:ext uri="{FF2B5EF4-FFF2-40B4-BE49-F238E27FC236}">
+                <a16:creationId xmlns:a16="http://schemas.microsoft.com/office/drawing/2014/main" id="{238B6860-59E5-7395-99AE-3F63A88D890C}"/>
+              </a:ext>
+            </a:extLst>
+          </p:cNvPr>
+          <p:cNvPicPr>
+            <a:picLocks noGrp="1" noChangeAspect="1"/>
+          </p:cNvPicPr>
+          <p:nvPr>
+            <p:ph idx="1"/>
+          </p:nvPr>
+        </p:nvPicPr>
+        <p:blipFill>
+          <a:blip r:embed="rId2"/>
+          <a:stretch>
+            <a:fillRect/>
+          </a:stretch>
+        </p:blipFill>
+        <p:spPr>
+          <a:xfrm>
+            <a:off x="15394" y="1200772"/>
+            <a:ext cx="12176605" cy="5062305"/>
+          </a:xfrm>
+        </p:spPr>
+      </p:pic>
+    </p:spTree>
+    <p:extLst>
+      <p:ext uri="{BB962C8B-B14F-4D97-AF65-F5344CB8AC3E}">
+        <p14:creationId xmlns:p14="http://schemas.microsoft.com/office/powerpoint/2010/main" val="936197267"/>
+      </p:ext>
+    </p:extLst>
+  </p:cSld>
+  <p:clrMapOvr>
+    <a:masterClrMapping/>
+  </p:clrMapOvr>
+</p:sld>
+</file>
+
+<file path=ppt/slides/slide6.xml><?xml version="1.0" encoding="utf-8"?>
 <p:sld xmlns:a="http://schemas.openxmlformats.org/drawingml/2006/main" xmlns:r="http://schemas.openxmlformats.org/officeDocument/2006/relationships" xmlns:p="http://schemas.openxmlformats.org/presentationml/2006/main">
   <p:cSld>
     <p:bg>
@@ -17592,7 +16791,7 @@
 </p:sld>
 </file>
 
-<file path=ppt/slides/slide5.xml><?xml version="1.0" encoding="utf-8"?>
+<file path=ppt/slides/slide7.xml><?xml version="1.0" encoding="utf-8"?>
 <p:sld xmlns:a="http://schemas.openxmlformats.org/drawingml/2006/main" xmlns:r="http://schemas.openxmlformats.org/officeDocument/2006/relationships" xmlns:p="http://schemas.openxmlformats.org/presentationml/2006/main">
   <p:cSld>
     <p:bg>
@@ -18801,7 +18000,7 @@
 </p:sld>
 </file>
 
-<file path=ppt/slides/slide6.xml><?xml version="1.0" encoding="utf-8"?>
+<file path=ppt/slides/slide8.xml><?xml version="1.0" encoding="utf-8"?>
 <p:sld xmlns:a="http://schemas.openxmlformats.org/drawingml/2006/main" xmlns:r="http://schemas.openxmlformats.org/officeDocument/2006/relationships" xmlns:p="http://schemas.openxmlformats.org/presentationml/2006/main">
   <p:cSld>
     <p:bg>
@@ -20008,7 +19207,7 @@
 </p:sld>
 </file>
 
-<file path=ppt/slides/slide7.xml><?xml version="1.0" encoding="utf-8"?>
+<file path=ppt/slides/slide9.xml><?xml version="1.0" encoding="utf-8"?>
 <p:sld xmlns:a="http://schemas.openxmlformats.org/drawingml/2006/main" xmlns:r="http://schemas.openxmlformats.org/officeDocument/2006/relationships" xmlns:p="http://schemas.openxmlformats.org/presentationml/2006/main">
   <p:cSld>
     <p:spTree>
@@ -20083,8 +19282,8 @@
         </p:blipFill>
         <p:spPr>
           <a:xfrm>
-            <a:off x="1205024" y="1470567"/>
-            <a:ext cx="9781953" cy="4847215"/>
+            <a:off x="1782297" y="1832325"/>
+            <a:ext cx="9812741" cy="4862609"/>
           </a:xfrm>
           <a:prstGeom prst="rect">
             <a:avLst/>
@@ -20093,10 +19292,51 @@
       </p:pic>
       <p:sp>
         <p:nvSpPr>
-          <p:cNvPr id="12" name="Content Placeholder 11">
+          <p:cNvPr id="3" name="TextBox 2">
             <a:extLst>
               <a:ext uri="{FF2B5EF4-FFF2-40B4-BE49-F238E27FC236}">
-                <a16:creationId xmlns:a16="http://schemas.microsoft.com/office/drawing/2014/main" id="{18FA869C-5D45-01B4-BCC8-55FDA5255A21}"/>
+                <a16:creationId xmlns:a16="http://schemas.microsoft.com/office/drawing/2014/main" id="{31023F0D-8D85-A0C8-AFD8-86DFB3D4826F}"/>
+              </a:ext>
+            </a:extLst>
+          </p:cNvPr>
+          <p:cNvSpPr txBox="1"/>
+          <p:nvPr/>
+        </p:nvSpPr>
+        <p:spPr>
+          <a:xfrm>
+            <a:off x="892848" y="1339272"/>
+            <a:ext cx="7158181" cy="369332"/>
+          </a:xfrm>
+          <a:prstGeom prst="rect">
+            <a:avLst/>
+          </a:prstGeom>
+          <a:noFill/>
+        </p:spPr>
+        <p:txBody>
+          <a:bodyPr rot="0" spcFirstLastPara="0" vertOverflow="overflow" horzOverflow="overflow" vert="horz" wrap="square" lIns="91440" tIns="45720" rIns="91440" bIns="45720" numCol="1" spcCol="0" rtlCol="0" fromWordArt="0" anchor="t" anchorCtr="0" forceAA="0" compatLnSpc="1">
+            <a:prstTxWarp prst="textNoShape">
+              <a:avLst/>
+            </a:prstTxWarp>
+            <a:spAutoFit/>
+          </a:bodyPr>
+          <a:lstStyle/>
+          <a:p>
+            <a:pPr marL="342900" indent="-342900">
+              <a:buAutoNum type="alphaLcParenR"/>
+            </a:pPr>
+            <a:r>
+              <a:rPr lang="en-US"/>
+              <a:t>Using random forest</a:t>
+            </a:r>
+          </a:p>
+        </p:txBody>
+      </p:sp>
+      <p:sp>
+        <p:nvSpPr>
+          <p:cNvPr id="6" name="Content Placeholder 5">
+            <a:extLst>
+              <a:ext uri="{FF2B5EF4-FFF2-40B4-BE49-F238E27FC236}">
+                <a16:creationId xmlns:a16="http://schemas.microsoft.com/office/drawing/2014/main" id="{FCFD7F89-EC61-B819-0C0D-5B6794D878E1}"/>
               </a:ext>
             </a:extLst>
           </p:cNvPr>
@@ -20120,237 +19360,6 @@
     <p:extLst>
       <p:ext uri="{BB962C8B-B14F-4D97-AF65-F5344CB8AC3E}">
         <p14:creationId xmlns:p14="http://schemas.microsoft.com/office/powerpoint/2010/main" val="1665873311"/>
-      </p:ext>
-    </p:extLst>
-  </p:cSld>
-  <p:clrMapOvr>
-    <a:masterClrMapping/>
-  </p:clrMapOvr>
-</p:sld>
-</file>
-
-<file path=ppt/slides/slide8.xml><?xml version="1.0" encoding="utf-8"?>
-<p:sld xmlns:a="http://schemas.openxmlformats.org/drawingml/2006/main" xmlns:r="http://schemas.openxmlformats.org/officeDocument/2006/relationships" xmlns:p="http://schemas.openxmlformats.org/presentationml/2006/main">
-  <p:cSld>
-    <p:spTree>
-      <p:nvGrpSpPr>
-        <p:cNvPr id="1" name=""/>
-        <p:cNvGrpSpPr/>
-        <p:nvPr/>
-      </p:nvGrpSpPr>
-      <p:grpSpPr>
-        <a:xfrm>
-          <a:off x="0" y="0"/>
-          <a:ext cx="0" cy="0"/>
-          <a:chOff x="0" y="0"/>
-          <a:chExt cx="0" cy="0"/>
-        </a:xfrm>
-      </p:grpSpPr>
-      <p:sp>
-        <p:nvSpPr>
-          <p:cNvPr id="2" name="Title 1">
-            <a:extLst>
-              <a:ext uri="{FF2B5EF4-FFF2-40B4-BE49-F238E27FC236}">
-                <a16:creationId xmlns:a16="http://schemas.microsoft.com/office/drawing/2014/main" id="{44316FE5-4E2E-937A-16E5-4730E8DF97EC}"/>
-              </a:ext>
-            </a:extLst>
-          </p:cNvPr>
-          <p:cNvSpPr>
-            <a:spLocks noGrp="1"/>
-          </p:cNvSpPr>
-          <p:nvPr>
-            <p:ph type="title"/>
-          </p:nvPr>
-        </p:nvSpPr>
-        <p:spPr>
-          <a:xfrm>
-            <a:off x="609600" y="-129578"/>
-            <a:ext cx="10972800" cy="1325563"/>
-          </a:xfrm>
-        </p:spPr>
-        <p:txBody>
-          <a:bodyPr/>
-          <a:lstStyle/>
-          <a:p>
-            <a:r>
-              <a:rPr lang="en-US">
-                <a:cs typeface="Posterama"/>
-              </a:rPr>
-              <a:t>4. Predictive Modeling</a:t>
-            </a:r>
-            <a:endParaRPr lang="en-US"/>
-          </a:p>
-        </p:txBody>
-      </p:sp>
-      <p:pic>
-        <p:nvPicPr>
-          <p:cNvPr id="9" name="Content Placeholder 6" descr="A graph with different colored bars&#10;&#10;Description automatically generated">
-            <a:extLst>
-              <a:ext uri="{FF2B5EF4-FFF2-40B4-BE49-F238E27FC236}">
-                <a16:creationId xmlns:a16="http://schemas.microsoft.com/office/drawing/2014/main" id="{D7D3CEDC-08F8-CBEF-9B55-4377A7F925E9}"/>
-              </a:ext>
-            </a:extLst>
-          </p:cNvPr>
-          <p:cNvPicPr>
-            <a:picLocks noChangeAspect="1"/>
-          </p:cNvPicPr>
-          <p:nvPr/>
-        </p:nvPicPr>
-        <p:blipFill>
-          <a:blip r:embed="rId2"/>
-          <a:stretch>
-            <a:fillRect/>
-          </a:stretch>
-        </p:blipFill>
-        <p:spPr>
-          <a:xfrm>
-            <a:off x="2222945" y="1319823"/>
-            <a:ext cx="7750075" cy="5273104"/>
-          </a:xfrm>
-          <a:prstGeom prst="rect">
-            <a:avLst/>
-          </a:prstGeom>
-        </p:spPr>
-      </p:pic>
-      <p:sp>
-        <p:nvSpPr>
-          <p:cNvPr id="4" name="Content Placeholder 3">
-            <a:extLst>
-              <a:ext uri="{FF2B5EF4-FFF2-40B4-BE49-F238E27FC236}">
-                <a16:creationId xmlns:a16="http://schemas.microsoft.com/office/drawing/2014/main" id="{4B15FA22-8E28-4725-CA61-F124A16F23BC}"/>
-              </a:ext>
-            </a:extLst>
-          </p:cNvPr>
-          <p:cNvSpPr>
-            <a:spLocks noGrp="1"/>
-          </p:cNvSpPr>
-          <p:nvPr>
-            <p:ph idx="1"/>
-          </p:nvPr>
-        </p:nvSpPr>
-        <p:spPr>
-          <a:xfrm>
-            <a:off x="7493430" y="2106204"/>
-            <a:ext cx="4515173" cy="1143518"/>
-          </a:xfrm>
-        </p:spPr>
-        <p:txBody>
-          <a:bodyPr vert="horz" lIns="91440" tIns="45720" rIns="91440" bIns="45720" rtlCol="0" anchor="t">
-            <a:normAutofit/>
-          </a:bodyPr>
-          <a:lstStyle/>
-          <a:p>
-            <a:endParaRPr lang="en-US"/>
-          </a:p>
-          <a:p>
-            <a:endParaRPr lang="en-US">
-              <a:ea typeface="+mn-lt"/>
-              <a:cs typeface="+mn-lt"/>
-            </a:endParaRPr>
-          </a:p>
-        </p:txBody>
-      </p:sp>
-    </p:spTree>
-    <p:extLst>
-      <p:ext uri="{BB962C8B-B14F-4D97-AF65-F5344CB8AC3E}">
-        <p14:creationId xmlns:p14="http://schemas.microsoft.com/office/powerpoint/2010/main" val="3685718716"/>
-      </p:ext>
-    </p:extLst>
-  </p:cSld>
-  <p:clrMapOvr>
-    <a:masterClrMapping/>
-  </p:clrMapOvr>
-</p:sld>
-</file>
-
-<file path=ppt/slides/slide9.xml><?xml version="1.0" encoding="utf-8"?>
-<p:sld xmlns:a="http://schemas.openxmlformats.org/drawingml/2006/main" xmlns:r="http://schemas.openxmlformats.org/officeDocument/2006/relationships" xmlns:p="http://schemas.openxmlformats.org/presentationml/2006/main">
-  <p:cSld>
-    <p:spTree>
-      <p:nvGrpSpPr>
-        <p:cNvPr id="1" name=""/>
-        <p:cNvGrpSpPr/>
-        <p:nvPr/>
-      </p:nvGrpSpPr>
-      <p:grpSpPr>
-        <a:xfrm>
-          <a:off x="0" y="0"/>
-          <a:ext cx="0" cy="0"/>
-          <a:chOff x="0" y="0"/>
-          <a:chExt cx="0" cy="0"/>
-        </a:xfrm>
-      </p:grpSpPr>
-      <p:sp>
-        <p:nvSpPr>
-          <p:cNvPr id="2" name="Title 1">
-            <a:extLst>
-              <a:ext uri="{FF2B5EF4-FFF2-40B4-BE49-F238E27FC236}">
-                <a16:creationId xmlns:a16="http://schemas.microsoft.com/office/drawing/2014/main" id="{21C7CBC9-23E0-7122-1161-5A9CBB7F1923}"/>
-              </a:ext>
-            </a:extLst>
-          </p:cNvPr>
-          <p:cNvSpPr>
-            <a:spLocks noGrp="1"/>
-          </p:cNvSpPr>
-          <p:nvPr>
-            <p:ph type="title"/>
-          </p:nvPr>
-        </p:nvSpPr>
-        <p:spPr>
-          <a:xfrm>
-            <a:off x="481491" y="2750050"/>
-            <a:ext cx="2721910" cy="1351393"/>
-          </a:xfrm>
-        </p:spPr>
-        <p:txBody>
-          <a:bodyPr vert="horz" lIns="91440" tIns="45720" rIns="91440" bIns="45720" rtlCol="0" anchor="b">
-            <a:noAutofit/>
-          </a:bodyPr>
-          <a:lstStyle/>
-          <a:p>
-            <a:pPr algn="just"/>
-            <a:r>
-              <a:rPr lang="en-US" sz="2000">
-                <a:ea typeface="+mj-lt"/>
-                <a:cs typeface="+mj-lt"/>
-              </a:rPr>
-              <a:t>Understanding the relationship between university raking and job prospects</a:t>
-            </a:r>
-          </a:p>
-        </p:txBody>
-      </p:sp>
-      <p:pic>
-        <p:nvPicPr>
-          <p:cNvPr id="6" name="Content Placeholder 5" descr="A screenshot of a computer&#10;&#10;Description automatically generated">
-            <a:extLst>
-              <a:ext uri="{FF2B5EF4-FFF2-40B4-BE49-F238E27FC236}">
-                <a16:creationId xmlns:a16="http://schemas.microsoft.com/office/drawing/2014/main" id="{26ED52D6-D91F-34B9-E065-ECCE626BDA4E}"/>
-              </a:ext>
-            </a:extLst>
-          </p:cNvPr>
-          <p:cNvPicPr>
-            <a:picLocks noGrp="1" noChangeAspect="1"/>
-          </p:cNvPicPr>
-          <p:nvPr>
-            <p:ph idx="1"/>
-          </p:nvPr>
-        </p:nvPicPr>
-        <p:blipFill rotWithShape="1">
-          <a:blip r:embed="rId2"/>
-          <a:srcRect t="707" r="-99"/>
-          <a:stretch/>
-        </p:blipFill>
-        <p:spPr>
-          <a:xfrm>
-            <a:off x="4032414" y="265393"/>
-            <a:ext cx="7530347" cy="6316842"/>
-          </a:xfrm>
-        </p:spPr>
-      </p:pic>
-    </p:spTree>
-    <p:extLst>
-      <p:ext uri="{BB962C8B-B14F-4D97-AF65-F5344CB8AC3E}">
-        <p14:creationId xmlns:p14="http://schemas.microsoft.com/office/powerpoint/2010/main" val="1587400543"/>
       </p:ext>
     </p:extLst>
   </p:cSld>

</xml_diff>